<commit_message>
fin du project + toutes les fonctionnalités demandées marchent
</commit_message>
<xml_diff>
--- a/P4_04_Presentation.pptx
+++ b/P4_04_Presentation.pptx
@@ -5,7 +5,7 @@
     <p:sldMasterId id="2147483659" r:id="rId1"/>
   </p:sldMasterIdLst>
   <p:notesMasterIdLst>
-    <p:notesMasterId r:id="rId23"/>
+    <p:notesMasterId r:id="rId21"/>
   </p:notesMasterIdLst>
   <p:sldIdLst>
     <p:sldId id="256" r:id="rId2"/>
@@ -26,33 +26,31 @@
     <p:sldId id="271" r:id="rId17"/>
     <p:sldId id="272" r:id="rId18"/>
     <p:sldId id="273" r:id="rId19"/>
-    <p:sldId id="274" r:id="rId20"/>
-    <p:sldId id="275" r:id="rId21"/>
-    <p:sldId id="276" r:id="rId22"/>
+    <p:sldId id="276" r:id="rId20"/>
   </p:sldIdLst>
   <p:sldSz cx="9144000" cy="5143500" type="screen16x9"/>
   <p:notesSz cx="6858000" cy="9144000"/>
   <p:embeddedFontLst>
     <p:embeddedFont>
-      <p:font typeface="Lato" charset="0"/>
-      <p:regular r:id="rId24"/>
-      <p:bold r:id="rId25"/>
-      <p:italic r:id="rId26"/>
-      <p:boldItalic r:id="rId27"/>
-    </p:embeddedFont>
-    <p:embeddedFont>
       <p:font typeface="Raleway" charset="0"/>
-      <p:regular r:id="rId28"/>
-      <p:bold r:id="rId29"/>
-      <p:italic r:id="rId30"/>
-      <p:boldItalic r:id="rId31"/>
+      <p:regular r:id="rId22"/>
+      <p:bold r:id="rId23"/>
+      <p:italic r:id="rId24"/>
+      <p:boldItalic r:id="rId25"/>
     </p:embeddedFont>
     <p:embeddedFont>
       <p:font typeface="Roboto" charset="0"/>
-      <p:regular r:id="rId32"/>
-      <p:bold r:id="rId33"/>
-      <p:italic r:id="rId34"/>
-      <p:boldItalic r:id="rId35"/>
+      <p:regular r:id="rId26"/>
+      <p:bold r:id="rId27"/>
+      <p:italic r:id="rId28"/>
+      <p:boldItalic r:id="rId29"/>
+    </p:embeddedFont>
+    <p:embeddedFont>
+      <p:font typeface="Lato" charset="0"/>
+      <p:regular r:id="rId30"/>
+      <p:bold r:id="rId31"/>
+      <p:italic r:id="rId32"/>
+      <p:boldItalic r:id="rId33"/>
     </p:embeddedFont>
   </p:embeddedFontLst>
   <p:defaultTextStyle>
@@ -286,7 +284,7 @@
   </p:defaultTextStyle>
   <p:extLst>
     <p:ext uri="{EFAFB233-063F-42B5-8137-9DF3F51BA10A}">
-      <p15:sldGuideLst xmlns:p15="http://schemas.microsoft.com/office/powerpoint/2012/main" xmlns:p14="http://schemas.microsoft.com/office/powerpoint/2010/main" xmlns:com="http://schemas.openxmlformats.org/drawingml/2006/compatibility" xmlns:pvml="urn:schemas-microsoft-com:office:powerpoint" xmlns:v="urn:schemas-microsoft-com:vml" xmlns:o="urn:schemas-microsoft-com:office:office" xmlns:dgm="http://schemas.openxmlformats.org/drawingml/2006/diagram" xmlns:c="http://schemas.openxmlformats.org/drawingml/2006/chart" xmlns:mv="urn:schemas-microsoft-com:mac:vml" xmlns:mc="http://schemas.openxmlformats.org/markup-compatibility/2006" xmlns="">
+      <p15:sldGuideLst xmlns="" xmlns:mc="http://schemas.openxmlformats.org/markup-compatibility/2006" xmlns:mv="urn:schemas-microsoft-com:mac:vml" xmlns:c="http://schemas.openxmlformats.org/drawingml/2006/chart" xmlns:dgm="http://schemas.openxmlformats.org/drawingml/2006/diagram" xmlns:o="urn:schemas-microsoft-com:office:office" xmlns:v="urn:schemas-microsoft-com:vml" xmlns:pvml="urn:schemas-microsoft-com:office:powerpoint" xmlns:com="http://schemas.openxmlformats.org/drawingml/2006/compatibility" xmlns:p14="http://schemas.microsoft.com/office/powerpoint/2010/main" xmlns:p15="http://schemas.microsoft.com/office/powerpoint/2012/main">
         <p15:guide id="1" orient="horz" pos="1620">
           <p15:clr>
             <a:srgbClr val="A4A3A4"/>
@@ -882,7 +880,7 @@
         </p:nvSpPr>
         <p:spPr>
           <a:xfrm>
-            <a:off x="381300" y="685800"/>
+            <a:off x="381000" y="685800"/>
             <a:ext cx="6096000" cy="3429000"/>
           </a:xfrm>
           <a:custGeom>
@@ -986,7 +984,7 @@
         </p:nvSpPr>
         <p:spPr>
           <a:xfrm>
-            <a:off x="381300" y="685800"/>
+            <a:off x="381000" y="685800"/>
             <a:ext cx="6096000" cy="3429000"/>
           </a:xfrm>
           <a:custGeom>
@@ -1090,7 +1088,7 @@
         </p:nvSpPr>
         <p:spPr>
           <a:xfrm>
-            <a:off x="381300" y="685800"/>
+            <a:off x="381000" y="685800"/>
             <a:ext cx="6096000" cy="3429000"/>
           </a:xfrm>
           <a:custGeom>
@@ -1194,7 +1192,7 @@
         </p:nvSpPr>
         <p:spPr>
           <a:xfrm>
-            <a:off x="381300" y="685800"/>
+            <a:off x="381000" y="685800"/>
             <a:ext cx="6096000" cy="3429000"/>
           </a:xfrm>
           <a:custGeom>
@@ -1298,7 +1296,7 @@
         </p:nvSpPr>
         <p:spPr>
           <a:xfrm>
-            <a:off x="381300" y="685800"/>
+            <a:off x="381000" y="685800"/>
             <a:ext cx="6096000" cy="3429000"/>
           </a:xfrm>
           <a:custGeom>
@@ -1402,7 +1400,7 @@
         </p:nvSpPr>
         <p:spPr>
           <a:xfrm>
-            <a:off x="381300" y="685800"/>
+            <a:off x="381000" y="685800"/>
             <a:ext cx="6096000" cy="3429000"/>
           </a:xfrm>
           <a:custGeom>
@@ -1506,7 +1504,7 @@
         </p:nvSpPr>
         <p:spPr>
           <a:xfrm>
-            <a:off x="381300" y="685800"/>
+            <a:off x="381000" y="685800"/>
             <a:ext cx="6096000" cy="3429000"/>
           </a:xfrm>
           <a:custGeom>
@@ -1610,7 +1608,7 @@
         </p:nvSpPr>
         <p:spPr>
           <a:xfrm>
-            <a:off x="381300" y="685800"/>
+            <a:off x="381000" y="685800"/>
             <a:ext cx="6096000" cy="3429000"/>
           </a:xfrm>
           <a:custGeom>
@@ -1714,7 +1712,7 @@
         </p:nvSpPr>
         <p:spPr>
           <a:xfrm>
-            <a:off x="381300" y="685800"/>
+            <a:off x="381000" y="685800"/>
             <a:ext cx="6096000" cy="3429000"/>
           </a:xfrm>
           <a:custGeom>
@@ -1794,7 +1792,7 @@
   <p:cSld>
     <p:spTree>
       <p:nvGrpSpPr>
-        <p:cNvPr id="1" name="Shape 197"/>
+        <p:cNvPr id="1" name="Shape 209"/>
         <p:cNvGrpSpPr/>
         <p:nvPr/>
       </p:nvGrpSpPr>
@@ -1808,7 +1806,7 @@
       </p:grpSpPr>
       <p:sp>
         <p:nvSpPr>
-          <p:cNvPr id="198" name="Google Shape;198;g6cf0a8d8c3_1_48:notes"/>
+          <p:cNvPr id="210" name="Google Shape;210;g6cf0a8d8c3_1_71:notes"/>
           <p:cNvSpPr>
             <a:spLocks noGrp="1" noRot="1" noChangeAspect="1"/>
           </p:cNvSpPr>
@@ -1849,7 +1847,7 @@
       </p:sp>
       <p:sp>
         <p:nvSpPr>
-          <p:cNvPr id="199" name="Google Shape;199;g6cf0a8d8c3_1_48:notes"/>
+          <p:cNvPr id="211" name="Google Shape;211;g6cf0a8d8c3_1_71:notes"/>
           <p:cNvSpPr txBox="1">
             <a:spLocks noGrp="1"/>
           </p:cNvSpPr>
@@ -1997,214 +1995,6 @@
 </p:notes>
 </file>
 
-<file path=ppt/notesSlides/notesSlide20.xml><?xml version="1.0" encoding="utf-8"?>
-<p:notes xmlns:a="http://schemas.openxmlformats.org/drawingml/2006/main" xmlns:r="http://schemas.openxmlformats.org/officeDocument/2006/relationships" xmlns:p="http://schemas.openxmlformats.org/presentationml/2006/main" showMasterSp="0" showMasterPhAnim="0">
-  <p:cSld>
-    <p:spTree>
-      <p:nvGrpSpPr>
-        <p:cNvPr id="1" name="Shape 203"/>
-        <p:cNvGrpSpPr/>
-        <p:nvPr/>
-      </p:nvGrpSpPr>
-      <p:grpSpPr>
-        <a:xfrm>
-          <a:off x="0" y="0"/>
-          <a:ext cx="0" cy="0"/>
-          <a:chOff x="0" y="0"/>
-          <a:chExt cx="0" cy="0"/>
-        </a:xfrm>
-      </p:grpSpPr>
-      <p:sp>
-        <p:nvSpPr>
-          <p:cNvPr id="204" name="Google Shape;204;g6cf0a8d8c3_1_54:notes"/>
-          <p:cNvSpPr>
-            <a:spLocks noGrp="1" noRot="1" noChangeAspect="1"/>
-          </p:cNvSpPr>
-          <p:nvPr>
-            <p:ph type="sldImg" idx="2"/>
-          </p:nvPr>
-        </p:nvSpPr>
-        <p:spPr>
-          <a:xfrm>
-            <a:off x="381300" y="685800"/>
-            <a:ext cx="6096000" cy="3429000"/>
-          </a:xfrm>
-          <a:custGeom>
-            <a:avLst/>
-            <a:gdLst/>
-            <a:ahLst/>
-            <a:cxnLst/>
-            <a:rect l="l" t="t" r="r" b="b"/>
-            <a:pathLst>
-              <a:path w="120000" h="120000" extrusionOk="0">
-                <a:moveTo>
-                  <a:pt x="0" y="0"/>
-                </a:moveTo>
-                <a:lnTo>
-                  <a:pt x="120000" y="0"/>
-                </a:lnTo>
-                <a:lnTo>
-                  <a:pt x="120000" y="120000"/>
-                </a:lnTo>
-                <a:lnTo>
-                  <a:pt x="0" y="120000"/>
-                </a:lnTo>
-                <a:close/>
-              </a:path>
-            </a:pathLst>
-          </a:custGeom>
-        </p:spPr>
-      </p:sp>
-      <p:sp>
-        <p:nvSpPr>
-          <p:cNvPr id="205" name="Google Shape;205;g6cf0a8d8c3_1_54:notes"/>
-          <p:cNvSpPr txBox="1">
-            <a:spLocks noGrp="1"/>
-          </p:cNvSpPr>
-          <p:nvPr>
-            <p:ph type="body" idx="1"/>
-          </p:nvPr>
-        </p:nvSpPr>
-        <p:spPr>
-          <a:xfrm>
-            <a:off x="685800" y="4343400"/>
-            <a:ext cx="5486400" cy="4114800"/>
-          </a:xfrm>
-          <a:prstGeom prst="rect">
-            <a:avLst/>
-          </a:prstGeom>
-        </p:spPr>
-        <p:txBody>
-          <a:bodyPr spcFirstLastPara="1" wrap="square" lIns="91425" tIns="91425" rIns="91425" bIns="91425" anchor="t" anchorCtr="0">
-            <a:noAutofit/>
-          </a:bodyPr>
-          <a:lstStyle/>
-          <a:p>
-            <a:pPr marL="0" lvl="0" indent="0" algn="l" rtl="0">
-              <a:spcBef>
-                <a:spcPts val="0"/>
-              </a:spcBef>
-              <a:spcAft>
-                <a:spcPts val="0"/>
-              </a:spcAft>
-              <a:buNone/>
-            </a:pPr>
-            <a:endParaRPr/>
-          </a:p>
-        </p:txBody>
-      </p:sp>
-    </p:spTree>
-  </p:cSld>
-  <p:clrMapOvr>
-    <a:masterClrMapping/>
-  </p:clrMapOvr>
-</p:notes>
-</file>
-
-<file path=ppt/notesSlides/notesSlide21.xml><?xml version="1.0" encoding="utf-8"?>
-<p:notes xmlns:a="http://schemas.openxmlformats.org/drawingml/2006/main" xmlns:r="http://schemas.openxmlformats.org/officeDocument/2006/relationships" xmlns:p="http://schemas.openxmlformats.org/presentationml/2006/main" showMasterSp="0" showMasterPhAnim="0">
-  <p:cSld>
-    <p:spTree>
-      <p:nvGrpSpPr>
-        <p:cNvPr id="1" name="Shape 209"/>
-        <p:cNvGrpSpPr/>
-        <p:nvPr/>
-      </p:nvGrpSpPr>
-      <p:grpSpPr>
-        <a:xfrm>
-          <a:off x="0" y="0"/>
-          <a:ext cx="0" cy="0"/>
-          <a:chOff x="0" y="0"/>
-          <a:chExt cx="0" cy="0"/>
-        </a:xfrm>
-      </p:grpSpPr>
-      <p:sp>
-        <p:nvSpPr>
-          <p:cNvPr id="210" name="Google Shape;210;g6cf0a8d8c3_1_71:notes"/>
-          <p:cNvSpPr>
-            <a:spLocks noGrp="1" noRot="1" noChangeAspect="1"/>
-          </p:cNvSpPr>
-          <p:nvPr>
-            <p:ph type="sldImg" idx="2"/>
-          </p:nvPr>
-        </p:nvSpPr>
-        <p:spPr>
-          <a:xfrm>
-            <a:off x="381300" y="685800"/>
-            <a:ext cx="6096000" cy="3429000"/>
-          </a:xfrm>
-          <a:custGeom>
-            <a:avLst/>
-            <a:gdLst/>
-            <a:ahLst/>
-            <a:cxnLst/>
-            <a:rect l="l" t="t" r="r" b="b"/>
-            <a:pathLst>
-              <a:path w="120000" h="120000" extrusionOk="0">
-                <a:moveTo>
-                  <a:pt x="0" y="0"/>
-                </a:moveTo>
-                <a:lnTo>
-                  <a:pt x="120000" y="0"/>
-                </a:lnTo>
-                <a:lnTo>
-                  <a:pt x="120000" y="120000"/>
-                </a:lnTo>
-                <a:lnTo>
-                  <a:pt x="0" y="120000"/>
-                </a:lnTo>
-                <a:close/>
-              </a:path>
-            </a:pathLst>
-          </a:custGeom>
-        </p:spPr>
-      </p:sp>
-      <p:sp>
-        <p:nvSpPr>
-          <p:cNvPr id="211" name="Google Shape;211;g6cf0a8d8c3_1_71:notes"/>
-          <p:cNvSpPr txBox="1">
-            <a:spLocks noGrp="1"/>
-          </p:cNvSpPr>
-          <p:nvPr>
-            <p:ph type="body" idx="1"/>
-          </p:nvPr>
-        </p:nvSpPr>
-        <p:spPr>
-          <a:xfrm>
-            <a:off x="685800" y="4343400"/>
-            <a:ext cx="5486400" cy="4114800"/>
-          </a:xfrm>
-          <a:prstGeom prst="rect">
-            <a:avLst/>
-          </a:prstGeom>
-        </p:spPr>
-        <p:txBody>
-          <a:bodyPr spcFirstLastPara="1" wrap="square" lIns="91425" tIns="91425" rIns="91425" bIns="91425" anchor="t" anchorCtr="0">
-            <a:noAutofit/>
-          </a:bodyPr>
-          <a:lstStyle/>
-          <a:p>
-            <a:pPr marL="0" lvl="0" indent="0" algn="l" rtl="0">
-              <a:spcBef>
-                <a:spcPts val="0"/>
-              </a:spcBef>
-              <a:spcAft>
-                <a:spcPts val="0"/>
-              </a:spcAft>
-              <a:buNone/>
-            </a:pPr>
-            <a:endParaRPr/>
-          </a:p>
-        </p:txBody>
-      </p:sp>
-    </p:spTree>
-  </p:cSld>
-  <p:clrMapOvr>
-    <a:masterClrMapping/>
-  </p:clrMapOvr>
-</p:notes>
-</file>
-
 <file path=ppt/notesSlides/notesSlide3.xml><?xml version="1.0" encoding="utf-8"?>
 <p:notes xmlns:a="http://schemas.openxmlformats.org/drawingml/2006/main" xmlns:r="http://schemas.openxmlformats.org/officeDocument/2006/relationships" xmlns:p="http://schemas.openxmlformats.org/presentationml/2006/main" showMasterSp="0" showMasterPhAnim="0">
   <p:cSld>
@@ -2338,7 +2128,7 @@
         </p:nvSpPr>
         <p:spPr>
           <a:xfrm>
-            <a:off x="381300" y="685800"/>
+            <a:off x="381000" y="685800"/>
             <a:ext cx="6096000" cy="3429000"/>
           </a:xfrm>
           <a:custGeom>
@@ -2442,7 +2232,7 @@
         </p:nvSpPr>
         <p:spPr>
           <a:xfrm>
-            <a:off x="381300" y="685800"/>
+            <a:off x="381000" y="685800"/>
             <a:ext cx="6096000" cy="3429000"/>
           </a:xfrm>
           <a:custGeom>
@@ -2546,7 +2336,7 @@
         </p:nvSpPr>
         <p:spPr>
           <a:xfrm>
-            <a:off x="381300" y="685800"/>
+            <a:off x="381000" y="685800"/>
             <a:ext cx="6096000" cy="3429000"/>
           </a:xfrm>
           <a:custGeom>
@@ -2650,7 +2440,7 @@
         </p:nvSpPr>
         <p:spPr>
           <a:xfrm>
-            <a:off x="381300" y="685800"/>
+            <a:off x="381000" y="685800"/>
             <a:ext cx="6096000" cy="3429000"/>
           </a:xfrm>
           <a:custGeom>
@@ -2754,7 +2544,7 @@
         </p:nvSpPr>
         <p:spPr>
           <a:xfrm>
-            <a:off x="381300" y="685800"/>
+            <a:off x="381000" y="685800"/>
             <a:ext cx="6096000" cy="3429000"/>
           </a:xfrm>
           <a:custGeom>
@@ -2858,7 +2648,7 @@
         </p:nvSpPr>
         <p:spPr>
           <a:xfrm>
-            <a:off x="381300" y="685800"/>
+            <a:off x="381000" y="685800"/>
             <a:ext cx="6096000" cy="3429000"/>
           </a:xfrm>
           <a:custGeom>
@@ -9251,7 +9041,7 @@
       </p:grpSpPr>
       <p:sp>
         <p:nvSpPr>
-          <p:cNvPr id="142" name="Google Shape;142;p22"/>
+          <p:cNvPr id="5" name="Google Shape;136;p21"/>
           <p:cNvSpPr txBox="1">
             <a:spLocks noGrp="1"/>
           </p:cNvSpPr>
@@ -9261,12 +9051,15 @@
         </p:nvSpPr>
         <p:spPr>
           <a:xfrm>
-            <a:off x="1600800" y="510850"/>
-            <a:ext cx="6321600" cy="635400"/>
+            <a:off x="629055" y="531843"/>
+            <a:ext cx="8286000" cy="1035699"/>
           </a:xfrm>
           <a:prstGeom prst="rect">
             <a:avLst/>
           </a:prstGeom>
+          <a:solidFill>
+            <a:srgbClr val="FCE5CD"/>
+          </a:solidFill>
         </p:spPr>
         <p:txBody>
           <a:bodyPr spcFirstLastPara="1" wrap="square" lIns="91425" tIns="91425" rIns="91425" bIns="91425" anchor="t" anchorCtr="0">
@@ -9275,66 +9068,35 @@
           <a:lstStyle/>
           <a:p>
             <a:pPr marL="0" lvl="0" indent="0" algn="ctr" rtl="0">
-              <a:spcBef>
-                <a:spcPts val="0"/>
-              </a:spcBef>
-              <a:spcAft>
-                <a:spcPts val="0"/>
+              <a:lnSpc>
+                <a:spcPct val="150000"/>
+              </a:lnSpc>
+              <a:spcBef>
+                <a:spcPts val="0"/>
+              </a:spcBef>
+              <a:spcAft>
+                <a:spcPts val="1600"/>
               </a:spcAft>
               <a:buNone/>
             </a:pPr>
             <a:r>
-              <a:rPr lang="fr">
+              <a:rPr lang="fr" sz="3600" b="0" dirty="0" smtClean="0">
                 <a:solidFill>
                   <a:schemeClr val="dk1"/>
                 </a:solidFill>
+                <a:latin typeface="Lato"/>
+                <a:sym typeface="Lato"/>
               </a:rPr>
-              <a:t>Schéma technique</a:t>
+              <a:t>Read</a:t>
             </a:r>
-            <a:r>
-              <a:rPr lang="fr">
-                <a:solidFill>
-                  <a:schemeClr val="accent5"/>
-                </a:solidFill>
-              </a:rPr>
-              <a:t> </a:t>
-            </a:r>
-            <a:endParaRPr>
+            <a:endParaRPr sz="3600" dirty="0">
               <a:solidFill>
-                <a:schemeClr val="accent5"/>
+                <a:schemeClr val="dk1"/>
               </a:solidFill>
             </a:endParaRPr>
           </a:p>
         </p:txBody>
       </p:sp>
-      <p:pic>
-        <p:nvPicPr>
-          <p:cNvPr id="143" name="Google Shape;143;p22"/>
-          <p:cNvPicPr preferRelativeResize="0"/>
-          <p:nvPr/>
-        </p:nvPicPr>
-        <p:blipFill>
-          <a:blip r:embed="rId3">
-            <a:alphaModFix/>
-          </a:blip>
-          <a:stretch>
-            <a:fillRect/>
-          </a:stretch>
-        </p:blipFill>
-        <p:spPr>
-          <a:xfrm>
-            <a:off x="1057176" y="1146250"/>
-            <a:ext cx="7725725" cy="3692450"/>
-          </a:xfrm>
-          <a:prstGeom prst="rect">
-            <a:avLst/>
-          </a:prstGeom>
-          <a:noFill/>
-          <a:ln>
-            <a:noFill/>
-          </a:ln>
-        </p:spPr>
-      </p:pic>
     </p:spTree>
   </p:cSld>
   <p:clrMapOvr>
@@ -9362,7 +9124,7 @@
       </p:grpSpPr>
       <p:sp>
         <p:nvSpPr>
-          <p:cNvPr id="148" name="Google Shape;148;p23"/>
+          <p:cNvPr id="6" name="Google Shape;136;p21"/>
           <p:cNvSpPr txBox="1">
             <a:spLocks noGrp="1"/>
           </p:cNvSpPr>
@@ -9372,8 +9134,8 @@
         </p:nvSpPr>
         <p:spPr>
           <a:xfrm>
-            <a:off x="683650" y="548625"/>
-            <a:ext cx="8286000" cy="830100"/>
+            <a:off x="629055" y="531843"/>
+            <a:ext cx="8286000" cy="1035699"/>
           </a:xfrm>
           <a:prstGeom prst="rect">
             <a:avLst/>
@@ -9401,18 +9163,16 @@
               <a:buNone/>
             </a:pPr>
             <a:r>
-              <a:rPr lang="fr" sz="3600" b="0">
+              <a:rPr lang="fr" sz="3600" b="0" dirty="0" smtClean="0">
                 <a:solidFill>
                   <a:schemeClr val="dk1"/>
                 </a:solidFill>
                 <a:latin typeface="Lato"/>
-                <a:ea typeface="Lato"/>
-                <a:cs typeface="Lato"/>
                 <a:sym typeface="Lato"/>
               </a:rPr>
-              <a:t>Classe StationData</a:t>
+              <a:t>Update</a:t>
             </a:r>
-            <a:endParaRPr sz="3600">
+            <a:endParaRPr sz="3600" dirty="0">
               <a:solidFill>
                 <a:schemeClr val="dk1"/>
               </a:solidFill>
@@ -9420,62 +9180,6 @@
           </a:p>
         </p:txBody>
       </p:sp>
-      <p:pic>
-        <p:nvPicPr>
-          <p:cNvPr id="149" name="Google Shape;149;p23"/>
-          <p:cNvPicPr preferRelativeResize="0"/>
-          <p:nvPr/>
-        </p:nvPicPr>
-        <p:blipFill>
-          <a:blip r:embed="rId3">
-            <a:alphaModFix/>
-          </a:blip>
-          <a:stretch>
-            <a:fillRect/>
-          </a:stretch>
-        </p:blipFill>
-        <p:spPr>
-          <a:xfrm>
-            <a:off x="797025" y="1781625"/>
-            <a:ext cx="3701876" cy="2708075"/>
-          </a:xfrm>
-          <a:prstGeom prst="rect">
-            <a:avLst/>
-          </a:prstGeom>
-          <a:noFill/>
-          <a:ln>
-            <a:noFill/>
-          </a:ln>
-        </p:spPr>
-      </p:pic>
-      <p:pic>
-        <p:nvPicPr>
-          <p:cNvPr id="150" name="Google Shape;150;p23"/>
-          <p:cNvPicPr preferRelativeResize="0"/>
-          <p:nvPr/>
-        </p:nvPicPr>
-        <p:blipFill>
-          <a:blip r:embed="rId4">
-            <a:alphaModFix/>
-          </a:blip>
-          <a:stretch>
-            <a:fillRect/>
-          </a:stretch>
-        </p:blipFill>
-        <p:spPr>
-          <a:xfrm>
-            <a:off x="5143500" y="1893550"/>
-            <a:ext cx="3476975" cy="2323300"/>
-          </a:xfrm>
-          <a:prstGeom prst="rect">
-            <a:avLst/>
-          </a:prstGeom>
-          <a:noFill/>
-          <a:ln>
-            <a:noFill/>
-          </a:ln>
-        </p:spPr>
-      </p:pic>
     </p:spTree>
   </p:cSld>
   <p:clrMapOvr>
@@ -9503,7 +9207,7 @@
       </p:grpSpPr>
       <p:sp>
         <p:nvSpPr>
-          <p:cNvPr id="155" name="Google Shape;155;p24"/>
+          <p:cNvPr id="6" name="Google Shape;136;p21"/>
           <p:cNvSpPr txBox="1">
             <a:spLocks noGrp="1"/>
           </p:cNvSpPr>
@@ -9513,8 +9217,8 @@
         </p:nvSpPr>
         <p:spPr>
           <a:xfrm>
-            <a:off x="683650" y="548625"/>
-            <a:ext cx="8286000" cy="830100"/>
+            <a:off x="629055" y="531843"/>
+            <a:ext cx="8286000" cy="1035699"/>
           </a:xfrm>
           <a:prstGeom prst="rect">
             <a:avLst/>
@@ -9542,18 +9246,16 @@
               <a:buNone/>
             </a:pPr>
             <a:r>
-              <a:rPr lang="fr" sz="3600" b="0">
+              <a:rPr lang="fr" sz="3600" b="0" dirty="0" smtClean="0">
                 <a:solidFill>
                   <a:schemeClr val="dk1"/>
                 </a:solidFill>
                 <a:latin typeface="Lato"/>
-                <a:ea typeface="Lato"/>
-                <a:cs typeface="Lato"/>
                 <a:sym typeface="Lato"/>
               </a:rPr>
-              <a:t>Classe Map</a:t>
+              <a:t>Delete</a:t>
             </a:r>
-            <a:endParaRPr sz="3600">
+            <a:endParaRPr sz="3600" dirty="0">
               <a:solidFill>
                 <a:schemeClr val="dk1"/>
               </a:solidFill>
@@ -9561,62 +9263,6 @@
           </a:p>
         </p:txBody>
       </p:sp>
-      <p:pic>
-        <p:nvPicPr>
-          <p:cNvPr id="156" name="Google Shape;156;p24"/>
-          <p:cNvPicPr preferRelativeResize="0"/>
-          <p:nvPr/>
-        </p:nvPicPr>
-        <p:blipFill>
-          <a:blip r:embed="rId3">
-            <a:alphaModFix/>
-          </a:blip>
-          <a:stretch>
-            <a:fillRect/>
-          </a:stretch>
-        </p:blipFill>
-        <p:spPr>
-          <a:xfrm>
-            <a:off x="416300" y="1651825"/>
-            <a:ext cx="4633200" cy="2866225"/>
-          </a:xfrm>
-          <a:prstGeom prst="rect">
-            <a:avLst/>
-          </a:prstGeom>
-          <a:noFill/>
-          <a:ln>
-            <a:noFill/>
-          </a:ln>
-        </p:spPr>
-      </p:pic>
-      <p:pic>
-        <p:nvPicPr>
-          <p:cNvPr id="157" name="Google Shape;157;p24"/>
-          <p:cNvPicPr preferRelativeResize="0"/>
-          <p:nvPr/>
-        </p:nvPicPr>
-        <p:blipFill>
-          <a:blip r:embed="rId4">
-            <a:alphaModFix/>
-          </a:blip>
-          <a:stretch>
-            <a:fillRect/>
-          </a:stretch>
-        </p:blipFill>
-        <p:spPr>
-          <a:xfrm>
-            <a:off x="5354300" y="2571750"/>
-            <a:ext cx="3789699" cy="477221"/>
-          </a:xfrm>
-          <a:prstGeom prst="rect">
-            <a:avLst/>
-          </a:prstGeom>
-          <a:noFill/>
-          <a:ln>
-            <a:noFill/>
-          </a:ln>
-        </p:spPr>
-      </p:pic>
     </p:spTree>
   </p:cSld>
   <p:clrMapOvr>
@@ -9644,7 +9290,7 @@
       </p:grpSpPr>
       <p:sp>
         <p:nvSpPr>
-          <p:cNvPr id="162" name="Google Shape;162;p25"/>
+          <p:cNvPr id="6" name="Google Shape;136;p21"/>
           <p:cNvSpPr txBox="1">
             <a:spLocks noGrp="1"/>
           </p:cNvSpPr>
@@ -9654,8 +9300,8 @@
         </p:nvSpPr>
         <p:spPr>
           <a:xfrm>
-            <a:off x="683650" y="548625"/>
-            <a:ext cx="8286000" cy="830100"/>
+            <a:off x="591732" y="1987419"/>
+            <a:ext cx="8286000" cy="1035699"/>
           </a:xfrm>
           <a:prstGeom prst="rect">
             <a:avLst/>
@@ -9683,18 +9329,16 @@
               <a:buNone/>
             </a:pPr>
             <a:r>
-              <a:rPr lang="fr" sz="3600" b="0">
+              <a:rPr lang="fr" sz="3600" b="0" dirty="0" smtClean="0">
                 <a:solidFill>
                   <a:schemeClr val="dk1"/>
                 </a:solidFill>
                 <a:latin typeface="Lato"/>
-                <a:ea typeface="Lato"/>
-                <a:cs typeface="Lato"/>
                 <a:sym typeface="Lato"/>
               </a:rPr>
-              <a:t>Classe Formulaire</a:t>
+              <a:t>L’espace membre</a:t>
             </a:r>
-            <a:endParaRPr sz="3600">
+            <a:endParaRPr sz="3600" dirty="0">
               <a:solidFill>
                 <a:schemeClr val="dk1"/>
               </a:solidFill>
@@ -9702,62 +9346,6 @@
           </a:p>
         </p:txBody>
       </p:sp>
-      <p:pic>
-        <p:nvPicPr>
-          <p:cNvPr id="163" name="Google Shape;163;p25"/>
-          <p:cNvPicPr preferRelativeResize="0"/>
-          <p:nvPr/>
-        </p:nvPicPr>
-        <p:blipFill>
-          <a:blip r:embed="rId3">
-            <a:alphaModFix/>
-          </a:blip>
-          <a:stretch>
-            <a:fillRect/>
-          </a:stretch>
-        </p:blipFill>
-        <p:spPr>
-          <a:xfrm>
-            <a:off x="152400" y="1531125"/>
-            <a:ext cx="4319625" cy="3162525"/>
-          </a:xfrm>
-          <a:prstGeom prst="rect">
-            <a:avLst/>
-          </a:prstGeom>
-          <a:noFill/>
-          <a:ln>
-            <a:noFill/>
-          </a:ln>
-        </p:spPr>
-      </p:pic>
-      <p:pic>
-        <p:nvPicPr>
-          <p:cNvPr id="164" name="Google Shape;164;p25"/>
-          <p:cNvPicPr preferRelativeResize="0"/>
-          <p:nvPr/>
-        </p:nvPicPr>
-        <p:blipFill>
-          <a:blip r:embed="rId4">
-            <a:alphaModFix/>
-          </a:blip>
-          <a:stretch>
-            <a:fillRect/>
-          </a:stretch>
-        </p:blipFill>
-        <p:spPr>
-          <a:xfrm>
-            <a:off x="4727175" y="1531125"/>
-            <a:ext cx="4264426" cy="3162525"/>
-          </a:xfrm>
-          <a:prstGeom prst="rect">
-            <a:avLst/>
-          </a:prstGeom>
-          <a:noFill/>
-          <a:ln>
-            <a:noFill/>
-          </a:ln>
-        </p:spPr>
-      </p:pic>
     </p:spTree>
   </p:cSld>
   <p:clrMapOvr>
@@ -9783,62 +9371,6 @@
           <a:chExt cx="0" cy="0"/>
         </a:xfrm>
       </p:grpSpPr>
-      <p:pic>
-        <p:nvPicPr>
-          <p:cNvPr id="169" name="Google Shape;169;p26"/>
-          <p:cNvPicPr preferRelativeResize="0"/>
-          <p:nvPr/>
-        </p:nvPicPr>
-        <p:blipFill>
-          <a:blip r:embed="rId3">
-            <a:alphaModFix/>
-          </a:blip>
-          <a:stretch>
-            <a:fillRect/>
-          </a:stretch>
-        </p:blipFill>
-        <p:spPr>
-          <a:xfrm>
-            <a:off x="71800" y="644625"/>
-            <a:ext cx="4628525" cy="3701875"/>
-          </a:xfrm>
-          <a:prstGeom prst="rect">
-            <a:avLst/>
-          </a:prstGeom>
-          <a:noFill/>
-          <a:ln>
-            <a:noFill/>
-          </a:ln>
-        </p:spPr>
-      </p:pic>
-      <p:pic>
-        <p:nvPicPr>
-          <p:cNvPr id="170" name="Google Shape;170;p26"/>
-          <p:cNvPicPr preferRelativeResize="0"/>
-          <p:nvPr/>
-        </p:nvPicPr>
-        <p:blipFill>
-          <a:blip r:embed="rId4">
-            <a:alphaModFix/>
-          </a:blip>
-          <a:stretch>
-            <a:fillRect/>
-          </a:stretch>
-        </p:blipFill>
-        <p:spPr>
-          <a:xfrm>
-            <a:off x="5040725" y="644625"/>
-            <a:ext cx="3950875" cy="3701875"/>
-          </a:xfrm>
-          <a:prstGeom prst="rect">
-            <a:avLst/>
-          </a:prstGeom>
-          <a:noFill/>
-          <a:ln>
-            <a:noFill/>
-          </a:ln>
-        </p:spPr>
-      </p:pic>
     </p:spTree>
   </p:cSld>
   <p:clrMapOvr>
@@ -9876,8 +9408,8 @@
         </p:nvSpPr>
         <p:spPr>
           <a:xfrm>
-            <a:off x="683650" y="548625"/>
-            <a:ext cx="8286000" cy="830100"/>
+            <a:off x="683650" y="548624"/>
+            <a:ext cx="8286000" cy="1009587"/>
           </a:xfrm>
           <a:prstGeom prst="rect">
             <a:avLst/>
@@ -9905,18 +9437,16 @@
               <a:buNone/>
             </a:pPr>
             <a:r>
-              <a:rPr lang="fr" sz="3600" b="0">
+              <a:rPr lang="fr" sz="3600" b="0" dirty="0" smtClean="0">
                 <a:solidFill>
                   <a:schemeClr val="dk1"/>
                 </a:solidFill>
                 <a:latin typeface="Lato"/>
-                <a:ea typeface="Lato"/>
-                <a:cs typeface="Lato"/>
                 <a:sym typeface="Lato"/>
               </a:rPr>
-              <a:t>Classe Compteur</a:t>
+              <a:t>Le signale et sa gestion</a:t>
             </a:r>
-            <a:endParaRPr sz="3600">
+            <a:endParaRPr sz="3600" dirty="0">
               <a:solidFill>
                 <a:schemeClr val="dk1"/>
               </a:solidFill>
@@ -9924,90 +9454,6 @@
           </a:p>
         </p:txBody>
       </p:sp>
-      <p:pic>
-        <p:nvPicPr>
-          <p:cNvPr id="176" name="Google Shape;176;p27"/>
-          <p:cNvPicPr preferRelativeResize="0"/>
-          <p:nvPr/>
-        </p:nvPicPr>
-        <p:blipFill>
-          <a:blip r:embed="rId3">
-            <a:alphaModFix/>
-          </a:blip>
-          <a:stretch>
-            <a:fillRect/>
-          </a:stretch>
-        </p:blipFill>
-        <p:spPr>
-          <a:xfrm>
-            <a:off x="152400" y="1531125"/>
-            <a:ext cx="3648149" cy="3169201"/>
-          </a:xfrm>
-          <a:prstGeom prst="rect">
-            <a:avLst/>
-          </a:prstGeom>
-          <a:noFill/>
-          <a:ln>
-            <a:noFill/>
-          </a:ln>
-        </p:spPr>
-      </p:pic>
-      <p:pic>
-        <p:nvPicPr>
-          <p:cNvPr id="177" name="Google Shape;177;p27"/>
-          <p:cNvPicPr preferRelativeResize="0"/>
-          <p:nvPr/>
-        </p:nvPicPr>
-        <p:blipFill>
-          <a:blip r:embed="rId4">
-            <a:alphaModFix/>
-          </a:blip>
-          <a:stretch>
-            <a:fillRect/>
-          </a:stretch>
-        </p:blipFill>
-        <p:spPr>
-          <a:xfrm>
-            <a:off x="3921425" y="1531125"/>
-            <a:ext cx="5048226" cy="2578300"/>
-          </a:xfrm>
-          <a:prstGeom prst="rect">
-            <a:avLst/>
-          </a:prstGeom>
-          <a:noFill/>
-          <a:ln>
-            <a:noFill/>
-          </a:ln>
-        </p:spPr>
-      </p:pic>
-      <p:pic>
-        <p:nvPicPr>
-          <p:cNvPr id="178" name="Google Shape;178;p27"/>
-          <p:cNvPicPr preferRelativeResize="0"/>
-          <p:nvPr/>
-        </p:nvPicPr>
-        <p:blipFill>
-          <a:blip r:embed="rId5">
-            <a:alphaModFix/>
-          </a:blip>
-          <a:stretch>
-            <a:fillRect/>
-          </a:stretch>
-        </p:blipFill>
-        <p:spPr>
-          <a:xfrm>
-            <a:off x="4491425" y="4315550"/>
-            <a:ext cx="3207976" cy="331050"/>
-          </a:xfrm>
-          <a:prstGeom prst="rect">
-            <a:avLst/>
-          </a:prstGeom>
-          <a:noFill/>
-          <a:ln>
-            <a:noFill/>
-          </a:ln>
-        </p:spPr>
-      </p:pic>
     </p:spTree>
   </p:cSld>
   <p:clrMapOvr>
@@ -10035,7 +9481,7 @@
       </p:grpSpPr>
       <p:sp>
         <p:nvSpPr>
-          <p:cNvPr id="183" name="Google Shape;183;p28"/>
+          <p:cNvPr id="6" name="Google Shape;136;p21"/>
           <p:cNvSpPr txBox="1">
             <a:spLocks noGrp="1"/>
           </p:cNvSpPr>
@@ -10045,8 +9491,8 @@
         </p:nvSpPr>
         <p:spPr>
           <a:xfrm>
-            <a:off x="683650" y="548625"/>
-            <a:ext cx="8286000" cy="830100"/>
+            <a:off x="657047" y="1894112"/>
+            <a:ext cx="8286000" cy="1035699"/>
           </a:xfrm>
           <a:prstGeom prst="rect">
             <a:avLst/>
@@ -10074,18 +9520,16 @@
               <a:buNone/>
             </a:pPr>
             <a:r>
-              <a:rPr lang="fr" sz="3600" b="0">
+              <a:rPr lang="fr" sz="3600" b="0" dirty="0" smtClean="0">
                 <a:solidFill>
                   <a:schemeClr val="dk1"/>
                 </a:solidFill>
                 <a:latin typeface="Lato"/>
-                <a:ea typeface="Lato"/>
-                <a:cs typeface="Lato"/>
                 <a:sym typeface="Lato"/>
               </a:rPr>
-              <a:t>Classe Canvas</a:t>
+              <a:t>Les difficultés rencontrées</a:t>
             </a:r>
-            <a:endParaRPr sz="3600">
+            <a:endParaRPr sz="3600" dirty="0">
               <a:solidFill>
                 <a:schemeClr val="dk1"/>
               </a:solidFill>
@@ -10093,62 +9537,6 @@
           </a:p>
         </p:txBody>
       </p:sp>
-      <p:pic>
-        <p:nvPicPr>
-          <p:cNvPr id="184" name="Google Shape;184;p28"/>
-          <p:cNvPicPr preferRelativeResize="0"/>
-          <p:nvPr/>
-        </p:nvPicPr>
-        <p:blipFill>
-          <a:blip r:embed="rId3">
-            <a:alphaModFix/>
-          </a:blip>
-          <a:stretch>
-            <a:fillRect/>
-          </a:stretch>
-        </p:blipFill>
-        <p:spPr>
-          <a:xfrm>
-            <a:off x="0" y="1441750"/>
-            <a:ext cx="4208325" cy="3013350"/>
-          </a:xfrm>
-          <a:prstGeom prst="rect">
-            <a:avLst/>
-          </a:prstGeom>
-          <a:noFill/>
-          <a:ln>
-            <a:noFill/>
-          </a:ln>
-        </p:spPr>
-      </p:pic>
-      <p:pic>
-        <p:nvPicPr>
-          <p:cNvPr id="185" name="Google Shape;185;p28"/>
-          <p:cNvPicPr preferRelativeResize="0"/>
-          <p:nvPr/>
-        </p:nvPicPr>
-        <p:blipFill>
-          <a:blip r:embed="rId4">
-            <a:alphaModFix/>
-          </a:blip>
-          <a:stretch>
-            <a:fillRect/>
-          </a:stretch>
-        </p:blipFill>
-        <p:spPr>
-          <a:xfrm>
-            <a:off x="5779950" y="1410250"/>
-            <a:ext cx="3025700" cy="3044849"/>
-          </a:xfrm>
-          <a:prstGeom prst="rect">
-            <a:avLst/>
-          </a:prstGeom>
-          <a:noFill/>
-          <a:ln>
-            <a:noFill/>
-          </a:ln>
-        </p:spPr>
-      </p:pic>
     </p:spTree>
   </p:cSld>
   <p:clrMapOvr>
@@ -10174,9 +9562,34 @@
           <a:chExt cx="0" cy="0"/>
         </a:xfrm>
       </p:grpSpPr>
+    </p:spTree>
+  </p:cSld>
+  <p:clrMapOvr>
+    <a:masterClrMapping/>
+  </p:clrMapOvr>
+</p:sld>
+</file>
+
+<file path=ppt/slides/slide18.xml><?xml version="1.0" encoding="utf-8"?>
+<p:sld xmlns:a="http://schemas.openxmlformats.org/drawingml/2006/main" xmlns:r="http://schemas.openxmlformats.org/officeDocument/2006/relationships" xmlns:p="http://schemas.openxmlformats.org/presentationml/2006/main">
+  <p:cSld>
+    <p:spTree>
+      <p:nvGrpSpPr>
+        <p:cNvPr id="1" name="Shape 194"/>
+        <p:cNvGrpSpPr/>
+        <p:nvPr/>
+      </p:nvGrpSpPr>
+      <p:grpSpPr>
+        <a:xfrm>
+          <a:off x="0" y="0"/>
+          <a:ext cx="0" cy="0"/>
+          <a:chOff x="0" y="0"/>
+          <a:chExt cx="0" cy="0"/>
+        </a:xfrm>
+      </p:grpSpPr>
       <p:sp>
         <p:nvSpPr>
-          <p:cNvPr id="190" name="Google Shape;190;p29"/>
+          <p:cNvPr id="5" name="Google Shape;190;p29"/>
           <p:cNvSpPr txBox="1">
             <a:spLocks noGrp="1"/>
           </p:cNvSpPr>
@@ -10246,974 +9659,7 @@
 </p:sld>
 </file>
 
-<file path=ppt/slides/slide18.xml><?xml version="1.0" encoding="utf-8"?>
-<p:sld xmlns:a="http://schemas.openxmlformats.org/drawingml/2006/main" xmlns:r="http://schemas.openxmlformats.org/officeDocument/2006/relationships" xmlns:p="http://schemas.openxmlformats.org/presentationml/2006/main">
-  <p:cSld>
-    <p:spTree>
-      <p:nvGrpSpPr>
-        <p:cNvPr id="1" name="Shape 194"/>
-        <p:cNvGrpSpPr/>
-        <p:nvPr/>
-      </p:nvGrpSpPr>
-      <p:grpSpPr>
-        <a:xfrm>
-          <a:off x="0" y="0"/>
-          <a:ext cx="0" cy="0"/>
-          <a:chOff x="0" y="0"/>
-          <a:chExt cx="0" cy="0"/>
-        </a:xfrm>
-      </p:grpSpPr>
-      <p:sp>
-        <p:nvSpPr>
-          <p:cNvPr id="195" name="Google Shape;195;p30"/>
-          <p:cNvSpPr txBox="1"/>
-          <p:nvPr/>
-        </p:nvSpPr>
-        <p:spPr>
-          <a:xfrm>
-            <a:off x="878850" y="1812975"/>
-            <a:ext cx="7386300" cy="2175600"/>
-          </a:xfrm>
-          <a:prstGeom prst="rect">
-            <a:avLst/>
-          </a:prstGeom>
-          <a:noFill/>
-          <a:ln>
-            <a:noFill/>
-          </a:ln>
-        </p:spPr>
-        <p:txBody>
-          <a:bodyPr spcFirstLastPara="1" wrap="square" lIns="91425" tIns="91425" rIns="91425" bIns="91425" anchor="t" anchorCtr="0">
-            <a:noAutofit/>
-          </a:bodyPr>
-          <a:lstStyle/>
-          <a:p>
-            <a:pPr marL="114300" marR="114300" lvl="0" indent="0" algn="ctr" rtl="0">
-              <a:lnSpc>
-                <a:spcPct val="115000"/>
-              </a:lnSpc>
-              <a:spcBef>
-                <a:spcPts val="1100"/>
-              </a:spcBef>
-              <a:spcAft>
-                <a:spcPts val="1100"/>
-              </a:spcAft>
-              <a:buNone/>
-            </a:pPr>
-            <a:r>
-              <a:rPr lang="fr" sz="1800">
-                <a:solidFill>
-                  <a:srgbClr val="333333"/>
-                </a:solidFill>
-                <a:highlight>
-                  <a:srgbClr val="FFFFFF"/>
-                </a:highlight>
-              </a:rPr>
-              <a:t>La mission d'un développeur Front-end consiste à participer à la création de l'interface utilisateur d'un site ou d'une application web. Il intervient sur tous les éléments apparaissant à l'écran et géré par le navigateur web de l'utilisateur. Il y a donc une partie design/ergonomie et une partie développement dans sa mission.</a:t>
-            </a:r>
-            <a:endParaRPr sz="1800">
-              <a:solidFill>
-                <a:srgbClr val="333333"/>
-              </a:solidFill>
-              <a:highlight>
-                <a:srgbClr val="FFFFFF"/>
-              </a:highlight>
-            </a:endParaRPr>
-          </a:p>
-        </p:txBody>
-      </p:sp>
-      <p:sp>
-        <p:nvSpPr>
-          <p:cNvPr id="196" name="Google Shape;196;p30"/>
-          <p:cNvSpPr txBox="1">
-            <a:spLocks noGrp="1"/>
-          </p:cNvSpPr>
-          <p:nvPr>
-            <p:ph type="title"/>
-          </p:nvPr>
-        </p:nvSpPr>
-        <p:spPr>
-          <a:xfrm>
-            <a:off x="396200" y="535200"/>
-            <a:ext cx="8286000" cy="830100"/>
-          </a:xfrm>
-          <a:prstGeom prst="rect">
-            <a:avLst/>
-          </a:prstGeom>
-          <a:solidFill>
-            <a:srgbClr val="FCE5CD"/>
-          </a:solidFill>
-        </p:spPr>
-        <p:txBody>
-          <a:bodyPr spcFirstLastPara="1" wrap="square" lIns="91425" tIns="91425" rIns="91425" bIns="91425" anchor="t" anchorCtr="0">
-            <a:noAutofit/>
-          </a:bodyPr>
-          <a:lstStyle/>
-          <a:p>
-            <a:pPr marL="0" lvl="0" indent="0" algn="ctr" rtl="0">
-              <a:lnSpc>
-                <a:spcPct val="150000"/>
-              </a:lnSpc>
-              <a:spcBef>
-                <a:spcPts val="0"/>
-              </a:spcBef>
-              <a:spcAft>
-                <a:spcPts val="0"/>
-              </a:spcAft>
-              <a:buNone/>
-            </a:pPr>
-            <a:r>
-              <a:rPr lang="fr" sz="3600" b="0">
-                <a:solidFill>
-                  <a:schemeClr val="dk1"/>
-                </a:solidFill>
-                <a:latin typeface="Lato"/>
-                <a:ea typeface="Lato"/>
-                <a:cs typeface="Lato"/>
-                <a:sym typeface="Lato"/>
-              </a:rPr>
-              <a:t>Rôle du développeur Front End</a:t>
-            </a:r>
-            <a:endParaRPr sz="3600" b="0">
-              <a:solidFill>
-                <a:schemeClr val="dk1"/>
-              </a:solidFill>
-              <a:latin typeface="Arial"/>
-              <a:ea typeface="Arial"/>
-              <a:cs typeface="Arial"/>
-              <a:sym typeface="Arial"/>
-            </a:endParaRPr>
-          </a:p>
-          <a:p>
-            <a:pPr marL="0" lvl="0" indent="0" algn="ctr" rtl="0">
-              <a:lnSpc>
-                <a:spcPct val="150000"/>
-              </a:lnSpc>
-              <a:spcBef>
-                <a:spcPts val="1600"/>
-              </a:spcBef>
-              <a:spcAft>
-                <a:spcPts val="1600"/>
-              </a:spcAft>
-              <a:buNone/>
-            </a:pPr>
-            <a:endParaRPr sz="3600" b="0">
-              <a:solidFill>
-                <a:schemeClr val="dk1"/>
-              </a:solidFill>
-              <a:latin typeface="Lato"/>
-              <a:ea typeface="Lato"/>
-              <a:cs typeface="Lato"/>
-              <a:sym typeface="Lato"/>
-            </a:endParaRPr>
-          </a:p>
-        </p:txBody>
-      </p:sp>
-    </p:spTree>
-  </p:cSld>
-  <p:clrMapOvr>
-    <a:masterClrMapping/>
-  </p:clrMapOvr>
-</p:sld>
-</file>
-
 <file path=ppt/slides/slide19.xml><?xml version="1.0" encoding="utf-8"?>
-<p:sld xmlns:a="http://schemas.openxmlformats.org/drawingml/2006/main" xmlns:r="http://schemas.openxmlformats.org/officeDocument/2006/relationships" xmlns:p="http://schemas.openxmlformats.org/presentationml/2006/main">
-  <p:cSld>
-    <p:spTree>
-      <p:nvGrpSpPr>
-        <p:cNvPr id="1" name="Shape 200"/>
-        <p:cNvGrpSpPr/>
-        <p:nvPr/>
-      </p:nvGrpSpPr>
-      <p:grpSpPr>
-        <a:xfrm>
-          <a:off x="0" y="0"/>
-          <a:ext cx="0" cy="0"/>
-          <a:chOff x="0" y="0"/>
-          <a:chExt cx="0" cy="0"/>
-        </a:xfrm>
-      </p:grpSpPr>
-      <p:sp>
-        <p:nvSpPr>
-          <p:cNvPr id="201" name="Google Shape;201;p31"/>
-          <p:cNvSpPr txBox="1">
-            <a:spLocks noGrp="1"/>
-          </p:cNvSpPr>
-          <p:nvPr>
-            <p:ph type="title"/>
-          </p:nvPr>
-        </p:nvSpPr>
-        <p:spPr>
-          <a:xfrm>
-            <a:off x="495650" y="535175"/>
-            <a:ext cx="8286000" cy="830100"/>
-          </a:xfrm>
-          <a:prstGeom prst="rect">
-            <a:avLst/>
-          </a:prstGeom>
-          <a:solidFill>
-            <a:srgbClr val="FCE5CD"/>
-          </a:solidFill>
-        </p:spPr>
-        <p:txBody>
-          <a:bodyPr spcFirstLastPara="1" wrap="square" lIns="91425" tIns="91425" rIns="91425" bIns="91425" anchor="t" anchorCtr="0">
-            <a:noAutofit/>
-          </a:bodyPr>
-          <a:lstStyle/>
-          <a:p>
-            <a:pPr marL="0" lvl="0" indent="0" algn="ctr" rtl="0">
-              <a:lnSpc>
-                <a:spcPct val="150000"/>
-              </a:lnSpc>
-              <a:spcBef>
-                <a:spcPts val="0"/>
-              </a:spcBef>
-              <a:spcAft>
-                <a:spcPts val="1600"/>
-              </a:spcAft>
-              <a:buNone/>
-            </a:pPr>
-            <a:r>
-              <a:rPr lang="fr" sz="3600" b="0">
-                <a:solidFill>
-                  <a:schemeClr val="dk1"/>
-                </a:solidFill>
-                <a:latin typeface="Lato"/>
-                <a:ea typeface="Lato"/>
-                <a:cs typeface="Lato"/>
-                <a:sym typeface="Lato"/>
-              </a:rPr>
-              <a:t>Difficultés rencontrées</a:t>
-            </a:r>
-            <a:endParaRPr sz="3600">
-              <a:solidFill>
-                <a:schemeClr val="dk1"/>
-              </a:solidFill>
-            </a:endParaRPr>
-          </a:p>
-        </p:txBody>
-      </p:sp>
-      <p:sp>
-        <p:nvSpPr>
-          <p:cNvPr id="202" name="Google Shape;202;p31"/>
-          <p:cNvSpPr txBox="1"/>
-          <p:nvPr/>
-        </p:nvSpPr>
-        <p:spPr>
-          <a:xfrm>
-            <a:off x="926625" y="1812975"/>
-            <a:ext cx="7338000" cy="2900700"/>
-          </a:xfrm>
-          <a:prstGeom prst="rect">
-            <a:avLst/>
-          </a:prstGeom>
-          <a:noFill/>
-          <a:ln>
-            <a:noFill/>
-          </a:ln>
-        </p:spPr>
-        <p:txBody>
-          <a:bodyPr spcFirstLastPara="1" wrap="square" lIns="91425" tIns="91425" rIns="91425" bIns="91425" anchor="t" anchorCtr="0">
-            <a:noAutofit/>
-          </a:bodyPr>
-          <a:lstStyle/>
-          <a:p>
-            <a:pPr marL="0" lvl="0" indent="0" algn="l" rtl="0">
-              <a:lnSpc>
-                <a:spcPct val="150000"/>
-              </a:lnSpc>
-              <a:spcBef>
-                <a:spcPts val="0"/>
-              </a:spcBef>
-              <a:spcAft>
-                <a:spcPts val="0"/>
-              </a:spcAft>
-              <a:buNone/>
-            </a:pPr>
-            <a:endParaRPr sz="1800" b="1">
-              <a:latin typeface="Lato"/>
-              <a:ea typeface="Lato"/>
-              <a:cs typeface="Lato"/>
-              <a:sym typeface="Lato"/>
-            </a:endParaRPr>
-          </a:p>
-          <a:p>
-            <a:pPr marL="457200" lvl="0" indent="-342900" algn="l" rtl="0">
-              <a:lnSpc>
-                <a:spcPct val="150000"/>
-              </a:lnSpc>
-              <a:spcBef>
-                <a:spcPts val="0"/>
-              </a:spcBef>
-              <a:spcAft>
-                <a:spcPts val="0"/>
-              </a:spcAft>
-              <a:buSzPts val="1800"/>
-              <a:buFont typeface="Lato"/>
-              <a:buChar char="➔"/>
-            </a:pPr>
-            <a:r>
-              <a:rPr lang="fr" sz="1800" b="1">
-                <a:latin typeface="Lato"/>
-                <a:ea typeface="Lato"/>
-                <a:cs typeface="Lato"/>
-                <a:sym typeface="Lato"/>
-              </a:rPr>
-              <a:t>JavaScript</a:t>
-            </a:r>
-            <a:r>
-              <a:rPr lang="fr" sz="1800">
-                <a:latin typeface="Lato"/>
-                <a:ea typeface="Lato"/>
-                <a:cs typeface="Lato"/>
-                <a:sym typeface="Lato"/>
-              </a:rPr>
-              <a:t> en lui même </a:t>
-            </a:r>
-            <a:endParaRPr sz="1800">
-              <a:latin typeface="Lato"/>
-              <a:ea typeface="Lato"/>
-              <a:cs typeface="Lato"/>
-              <a:sym typeface="Lato"/>
-            </a:endParaRPr>
-          </a:p>
-          <a:p>
-            <a:pPr marL="457200" lvl="0" indent="-342900" algn="l" rtl="0">
-              <a:lnSpc>
-                <a:spcPct val="150000"/>
-              </a:lnSpc>
-              <a:spcBef>
-                <a:spcPts val="0"/>
-              </a:spcBef>
-              <a:spcAft>
-                <a:spcPts val="0"/>
-              </a:spcAft>
-              <a:buSzPts val="1800"/>
-              <a:buFont typeface="Lato"/>
-              <a:buChar char="➔"/>
-            </a:pPr>
-            <a:r>
-              <a:rPr lang="fr" sz="1800">
-                <a:latin typeface="Lato"/>
-                <a:ea typeface="Lato"/>
-                <a:cs typeface="Lato"/>
-                <a:sym typeface="Lato"/>
-              </a:rPr>
-              <a:t>Le fonctionnement </a:t>
-            </a:r>
-            <a:r>
-              <a:rPr lang="fr" sz="1800" b="1">
-                <a:latin typeface="Lato"/>
-                <a:ea typeface="Lato"/>
-                <a:cs typeface="Lato"/>
-                <a:sym typeface="Lato"/>
-              </a:rPr>
-              <a:t>des classes </a:t>
-            </a:r>
-            <a:endParaRPr sz="1800" b="1">
-              <a:latin typeface="Lato"/>
-              <a:ea typeface="Lato"/>
-              <a:cs typeface="Lato"/>
-              <a:sym typeface="Lato"/>
-            </a:endParaRPr>
-          </a:p>
-          <a:p>
-            <a:pPr marL="457200" lvl="0" indent="-342900" algn="l" rtl="0">
-              <a:lnSpc>
-                <a:spcPct val="150000"/>
-              </a:lnSpc>
-              <a:spcBef>
-                <a:spcPts val="0"/>
-              </a:spcBef>
-              <a:spcAft>
-                <a:spcPts val="0"/>
-              </a:spcAft>
-              <a:buSzPts val="1800"/>
-              <a:buFont typeface="Lato"/>
-              <a:buChar char="➔"/>
-            </a:pPr>
-            <a:r>
-              <a:rPr lang="fr" sz="1800">
-                <a:latin typeface="Lato"/>
-                <a:ea typeface="Lato"/>
-                <a:cs typeface="Lato"/>
-                <a:sym typeface="Lato"/>
-              </a:rPr>
-              <a:t>Local et session </a:t>
-            </a:r>
-            <a:r>
-              <a:rPr lang="fr" sz="1800" b="1">
-                <a:latin typeface="Lato"/>
-                <a:ea typeface="Lato"/>
-                <a:cs typeface="Lato"/>
-                <a:sym typeface="Lato"/>
-              </a:rPr>
-              <a:t>Storage</a:t>
-            </a:r>
-            <a:endParaRPr sz="1800" b="1">
-              <a:latin typeface="Lato"/>
-              <a:ea typeface="Lato"/>
-              <a:cs typeface="Lato"/>
-              <a:sym typeface="Lato"/>
-            </a:endParaRPr>
-          </a:p>
-          <a:p>
-            <a:pPr marL="457200" lvl="0" indent="-342900" algn="l" rtl="0">
-              <a:spcBef>
-                <a:spcPts val="0"/>
-              </a:spcBef>
-              <a:spcAft>
-                <a:spcPts val="0"/>
-              </a:spcAft>
-              <a:buSzPts val="1800"/>
-              <a:buFont typeface="Lato"/>
-              <a:buChar char="➔"/>
-            </a:pPr>
-            <a:r>
-              <a:rPr lang="fr" sz="1800">
-                <a:latin typeface="Lato"/>
-                <a:ea typeface="Lato"/>
-                <a:cs typeface="Lato"/>
-                <a:sym typeface="Lato"/>
-              </a:rPr>
-              <a:t>La gestion du temps du </a:t>
-            </a:r>
-            <a:r>
-              <a:rPr lang="fr" sz="1800" b="1">
-                <a:latin typeface="Lato"/>
-                <a:ea typeface="Lato"/>
-                <a:cs typeface="Lato"/>
-                <a:sym typeface="Lato"/>
-              </a:rPr>
-              <a:t>projet</a:t>
-            </a:r>
-            <a:endParaRPr sz="1800" b="1">
-              <a:latin typeface="Lato"/>
-              <a:ea typeface="Lato"/>
-              <a:cs typeface="Lato"/>
-              <a:sym typeface="Lato"/>
-            </a:endParaRPr>
-          </a:p>
-        </p:txBody>
-      </p:sp>
-    </p:spTree>
-  </p:cSld>
-  <p:clrMapOvr>
-    <a:masterClrMapping/>
-  </p:clrMapOvr>
-</p:sld>
-</file>
-
-<file path=ppt/slides/slide2.xml><?xml version="1.0" encoding="utf-8"?>
-<p:sld xmlns:a="http://schemas.openxmlformats.org/drawingml/2006/main" xmlns:r="http://schemas.openxmlformats.org/officeDocument/2006/relationships" xmlns:p="http://schemas.openxmlformats.org/presentationml/2006/main">
-  <p:cSld>
-    <p:spTree>
-      <p:nvGrpSpPr>
-        <p:cNvPr id="1" name="Shape 78"/>
-        <p:cNvGrpSpPr/>
-        <p:nvPr/>
-      </p:nvGrpSpPr>
-      <p:grpSpPr>
-        <a:xfrm>
-          <a:off x="0" y="0"/>
-          <a:ext cx="0" cy="0"/>
-          <a:chOff x="0" y="0"/>
-          <a:chExt cx="0" cy="0"/>
-        </a:xfrm>
-      </p:grpSpPr>
-      <p:sp>
-        <p:nvSpPr>
-          <p:cNvPr id="79" name="Google Shape;79;p14"/>
-          <p:cNvSpPr txBox="1">
-            <a:spLocks noGrp="1"/>
-          </p:cNvSpPr>
-          <p:nvPr>
-            <p:ph type="title"/>
-          </p:nvPr>
-        </p:nvSpPr>
-        <p:spPr>
-          <a:xfrm>
-            <a:off x="1688750" y="412875"/>
-            <a:ext cx="6321600" cy="635400"/>
-          </a:xfrm>
-          <a:prstGeom prst="rect">
-            <a:avLst/>
-          </a:prstGeom>
-        </p:spPr>
-        <p:txBody>
-          <a:bodyPr spcFirstLastPara="1" wrap="square" lIns="91425" tIns="91425" rIns="91425" bIns="91425" anchor="t" anchorCtr="0">
-            <a:noAutofit/>
-          </a:bodyPr>
-          <a:lstStyle/>
-          <a:p>
-            <a:pPr marL="0" lvl="0" indent="0" algn="ctr" rtl="0">
-              <a:spcBef>
-                <a:spcPts val="0"/>
-              </a:spcBef>
-              <a:spcAft>
-                <a:spcPts val="0"/>
-              </a:spcAft>
-              <a:buNone/>
-            </a:pPr>
-            <a:r>
-              <a:rPr lang="fr" dirty="0">
-                <a:solidFill>
-                  <a:srgbClr val="E69138"/>
-                </a:solidFill>
-              </a:rPr>
-              <a:t>Plan de la présentation</a:t>
-            </a:r>
-            <a:r>
-              <a:rPr lang="fr" dirty="0"/>
-              <a:t> </a:t>
-            </a:r>
-            <a:endParaRPr dirty="0"/>
-          </a:p>
-        </p:txBody>
-      </p:sp>
-      <p:sp>
-        <p:nvSpPr>
-          <p:cNvPr id="80" name="Google Shape;80;p14"/>
-          <p:cNvSpPr txBox="1">
-            <a:spLocks noGrp="1"/>
-          </p:cNvSpPr>
-          <p:nvPr>
-            <p:ph type="body" idx="1"/>
-          </p:nvPr>
-        </p:nvSpPr>
-        <p:spPr>
-          <a:xfrm>
-            <a:off x="1291550" y="974150"/>
-            <a:ext cx="7116000" cy="3724800"/>
-          </a:xfrm>
-          <a:prstGeom prst="rect">
-            <a:avLst/>
-          </a:prstGeom>
-        </p:spPr>
-        <p:txBody>
-          <a:bodyPr spcFirstLastPara="1" wrap="square" lIns="91425" tIns="91425" rIns="91425" bIns="91425" anchor="t" anchorCtr="0">
-            <a:noAutofit/>
-          </a:bodyPr>
-          <a:lstStyle/>
-          <a:p>
-            <a:pPr marL="457200" lvl="0" indent="-355600" algn="l" rtl="0">
-              <a:lnSpc>
-                <a:spcPct val="150000"/>
-              </a:lnSpc>
-              <a:spcBef>
-                <a:spcPts val="0"/>
-              </a:spcBef>
-              <a:spcAft>
-                <a:spcPts val="0"/>
-              </a:spcAft>
-              <a:buSzPts val="2000"/>
-              <a:buChar char="➢"/>
-            </a:pPr>
-            <a:r>
-              <a:rPr lang="fr" dirty="0"/>
-              <a:t>O</a:t>
-            </a:r>
-            <a:r>
-              <a:rPr lang="fr" dirty="0" smtClean="0"/>
-              <a:t>bjectif </a:t>
-            </a:r>
-            <a:r>
-              <a:rPr lang="fr" dirty="0"/>
-              <a:t>de la mission</a:t>
-            </a:r>
-            <a:endParaRPr dirty="0"/>
-          </a:p>
-          <a:p>
-            <a:pPr lvl="1" indent="-355600">
-              <a:lnSpc>
-                <a:spcPct val="150000"/>
-              </a:lnSpc>
-              <a:spcBef>
-                <a:spcPts val="0"/>
-              </a:spcBef>
-              <a:buSzPts val="2000"/>
-              <a:buChar char="➢"/>
-            </a:pPr>
-            <a:r>
-              <a:rPr lang="fr-FR" dirty="0" smtClean="0"/>
-              <a:t>Une </a:t>
-            </a:r>
-            <a:r>
-              <a:rPr lang="fr-FR" dirty="0" smtClean="0"/>
-              <a:t>interface </a:t>
-            </a:r>
-            <a:r>
-              <a:rPr lang="fr-FR" dirty="0" err="1" smtClean="0"/>
-              <a:t>Frontend</a:t>
-            </a:r>
-            <a:r>
-              <a:rPr lang="fr-FR" dirty="0" smtClean="0"/>
-              <a:t> et </a:t>
-            </a:r>
-            <a:r>
-              <a:rPr lang="fr-FR" dirty="0" err="1" smtClean="0"/>
-              <a:t>Backend</a:t>
-            </a:r>
-            <a:r>
-              <a:rPr lang="fr-FR" dirty="0" smtClean="0"/>
-              <a:t> pour les chapitres crées </a:t>
-            </a:r>
-            <a:endParaRPr dirty="0"/>
-          </a:p>
-          <a:p>
-            <a:pPr lvl="1" indent="-355600">
-              <a:lnSpc>
-                <a:spcPct val="150000"/>
-              </a:lnSpc>
-              <a:spcBef>
-                <a:spcPts val="0"/>
-              </a:spcBef>
-              <a:buSzPts val="2000"/>
-              <a:buChar char="➢"/>
-            </a:pPr>
-            <a:r>
-              <a:rPr lang="fr-FR" dirty="0" smtClean="0"/>
-              <a:t>L</a:t>
-            </a:r>
-            <a:r>
-              <a:rPr lang="fr" dirty="0" smtClean="0"/>
-              <a:t>e CRUD</a:t>
-            </a:r>
-            <a:endParaRPr dirty="0"/>
-          </a:p>
-          <a:p>
-            <a:pPr lvl="1" indent="-355600">
-              <a:lnSpc>
-                <a:spcPct val="150000"/>
-              </a:lnSpc>
-              <a:spcBef>
-                <a:spcPts val="0"/>
-              </a:spcBef>
-              <a:buSzPts val="2000"/>
-              <a:buChar char="➢"/>
-            </a:pPr>
-            <a:r>
-              <a:rPr lang="fr-FR" dirty="0" smtClean="0"/>
-              <a:t>Le signale du commentaire  et sa gestion</a:t>
-            </a:r>
-          </a:p>
-          <a:p>
-            <a:pPr lvl="1" indent="-355600">
-              <a:lnSpc>
-                <a:spcPct val="150000"/>
-              </a:lnSpc>
-              <a:spcBef>
-                <a:spcPts val="0"/>
-              </a:spcBef>
-              <a:buSzPts val="2000"/>
-              <a:buFont typeface="Lato"/>
-              <a:buChar char="➢"/>
-            </a:pPr>
-            <a:r>
-              <a:rPr lang="fr-FR"/>
-              <a:t>L’interface d’administration, et  WYSIWYG pour </a:t>
-            </a:r>
-            <a:r>
-              <a:rPr lang="fr-FR"/>
-              <a:t>la </a:t>
-            </a:r>
-            <a:r>
-              <a:rPr lang="fr-FR" smtClean="0"/>
-              <a:t>rédaction</a:t>
-            </a:r>
-            <a:endParaRPr dirty="0"/>
-          </a:p>
-          <a:p>
-            <a:pPr marL="457200" lvl="0" indent="-355600" algn="l" rtl="0">
-              <a:lnSpc>
-                <a:spcPct val="150000"/>
-              </a:lnSpc>
-              <a:spcBef>
-                <a:spcPts val="0"/>
-              </a:spcBef>
-              <a:spcAft>
-                <a:spcPts val="0"/>
-              </a:spcAft>
-              <a:buSzPts val="2000"/>
-              <a:buChar char="➢"/>
-            </a:pPr>
-            <a:r>
-              <a:rPr lang="fr" dirty="0" smtClean="0"/>
-              <a:t>Difficultés rencontrées</a:t>
-            </a:r>
-          </a:p>
-          <a:p>
-            <a:pPr marL="457200" lvl="0" indent="-355600" algn="l" rtl="0">
-              <a:lnSpc>
-                <a:spcPct val="150000"/>
-              </a:lnSpc>
-              <a:spcBef>
-                <a:spcPts val="0"/>
-              </a:spcBef>
-              <a:spcAft>
-                <a:spcPts val="0"/>
-              </a:spcAft>
-              <a:buSzPts val="2000"/>
-              <a:buChar char="➢"/>
-            </a:pPr>
-            <a:r>
-              <a:rPr lang="fr" dirty="0" smtClean="0"/>
-              <a:t>Une petite démonstration du site </a:t>
-            </a:r>
-            <a:endParaRPr dirty="0"/>
-          </a:p>
-        </p:txBody>
-      </p:sp>
-    </p:spTree>
-  </p:cSld>
-  <p:clrMapOvr>
-    <a:masterClrMapping/>
-  </p:clrMapOvr>
-</p:sld>
-</file>
-
-<file path=ppt/slides/slide20.xml><?xml version="1.0" encoding="utf-8"?>
-<p:sld xmlns:a="http://schemas.openxmlformats.org/drawingml/2006/main" xmlns:r="http://schemas.openxmlformats.org/officeDocument/2006/relationships" xmlns:p="http://schemas.openxmlformats.org/presentationml/2006/main">
-  <p:cSld>
-    <p:spTree>
-      <p:nvGrpSpPr>
-        <p:cNvPr id="1" name="Shape 206"/>
-        <p:cNvGrpSpPr/>
-        <p:nvPr/>
-      </p:nvGrpSpPr>
-      <p:grpSpPr>
-        <a:xfrm>
-          <a:off x="0" y="0"/>
-          <a:ext cx="0" cy="0"/>
-          <a:chOff x="0" y="0"/>
-          <a:chExt cx="0" cy="0"/>
-        </a:xfrm>
-      </p:grpSpPr>
-      <p:sp>
-        <p:nvSpPr>
-          <p:cNvPr id="207" name="Google Shape;207;p32"/>
-          <p:cNvSpPr txBox="1">
-            <a:spLocks noGrp="1"/>
-          </p:cNvSpPr>
-          <p:nvPr>
-            <p:ph type="title"/>
-          </p:nvPr>
-        </p:nvSpPr>
-        <p:spPr>
-          <a:xfrm>
-            <a:off x="495650" y="535175"/>
-            <a:ext cx="8286000" cy="830100"/>
-          </a:xfrm>
-          <a:prstGeom prst="rect">
-            <a:avLst/>
-          </a:prstGeom>
-          <a:solidFill>
-            <a:srgbClr val="FCE5CD"/>
-          </a:solidFill>
-        </p:spPr>
-        <p:txBody>
-          <a:bodyPr spcFirstLastPara="1" wrap="square" lIns="91425" tIns="91425" rIns="91425" bIns="91425" anchor="t" anchorCtr="0">
-            <a:noAutofit/>
-          </a:bodyPr>
-          <a:lstStyle/>
-          <a:p>
-            <a:pPr marL="0" lvl="0" indent="0" algn="ctr" rtl="0">
-              <a:lnSpc>
-                <a:spcPct val="150000"/>
-              </a:lnSpc>
-              <a:spcBef>
-                <a:spcPts val="0"/>
-              </a:spcBef>
-              <a:spcAft>
-                <a:spcPts val="1600"/>
-              </a:spcAft>
-              <a:buNone/>
-            </a:pPr>
-            <a:r>
-              <a:rPr lang="fr" sz="3600" b="0">
-                <a:solidFill>
-                  <a:schemeClr val="dk1"/>
-                </a:solidFill>
-                <a:latin typeface="Lato"/>
-                <a:ea typeface="Lato"/>
-                <a:cs typeface="Lato"/>
-                <a:sym typeface="Lato"/>
-              </a:rPr>
-              <a:t>Perspective d’amélioration</a:t>
-            </a:r>
-            <a:endParaRPr sz="3600">
-              <a:solidFill>
-                <a:schemeClr val="dk1"/>
-              </a:solidFill>
-            </a:endParaRPr>
-          </a:p>
-        </p:txBody>
-      </p:sp>
-      <p:sp>
-        <p:nvSpPr>
-          <p:cNvPr id="208" name="Google Shape;208;p32"/>
-          <p:cNvSpPr txBox="1"/>
-          <p:nvPr/>
-        </p:nvSpPr>
-        <p:spPr>
-          <a:xfrm>
-            <a:off x="969650" y="1592225"/>
-            <a:ext cx="7338000" cy="2981400"/>
-          </a:xfrm>
-          <a:prstGeom prst="rect">
-            <a:avLst/>
-          </a:prstGeom>
-          <a:noFill/>
-          <a:ln>
-            <a:noFill/>
-          </a:ln>
-        </p:spPr>
-        <p:txBody>
-          <a:bodyPr spcFirstLastPara="1" wrap="square" lIns="91425" tIns="91425" rIns="91425" bIns="91425" anchor="t" anchorCtr="0">
-            <a:noAutofit/>
-          </a:bodyPr>
-          <a:lstStyle/>
-          <a:p>
-            <a:pPr marL="457200" lvl="0" indent="-342900" algn="l" rtl="0">
-              <a:lnSpc>
-                <a:spcPct val="150000"/>
-              </a:lnSpc>
-              <a:spcBef>
-                <a:spcPts val="0"/>
-              </a:spcBef>
-              <a:spcAft>
-                <a:spcPts val="0"/>
-              </a:spcAft>
-              <a:buSzPts val="1800"/>
-              <a:buFont typeface="Lato"/>
-              <a:buChar char="➔"/>
-            </a:pPr>
-            <a:r>
-              <a:rPr lang="fr" sz="1800">
-                <a:latin typeface="Lato"/>
-                <a:ea typeface="Lato"/>
-                <a:cs typeface="Lato"/>
-                <a:sym typeface="Lato"/>
-              </a:rPr>
-              <a:t>Enregistrer les données dans un </a:t>
-            </a:r>
-            <a:r>
-              <a:rPr lang="fr" sz="1800" b="1">
-                <a:latin typeface="Lato"/>
-                <a:ea typeface="Lato"/>
-                <a:cs typeface="Lato"/>
-                <a:sym typeface="Lato"/>
-              </a:rPr>
-              <a:t>serveur</a:t>
-            </a:r>
-            <a:r>
-              <a:rPr lang="fr" sz="1800">
-                <a:latin typeface="Lato"/>
-                <a:ea typeface="Lato"/>
-                <a:cs typeface="Lato"/>
-                <a:sym typeface="Lato"/>
-              </a:rPr>
-              <a:t> au lieu sur le </a:t>
-            </a:r>
-            <a:r>
-              <a:rPr lang="fr" sz="1800" b="1">
-                <a:latin typeface="Lato"/>
-                <a:ea typeface="Lato"/>
-                <a:cs typeface="Lato"/>
-                <a:sym typeface="Lato"/>
-              </a:rPr>
-              <a:t>navigateur </a:t>
-            </a:r>
-            <a:r>
-              <a:rPr lang="fr" sz="1800">
-                <a:latin typeface="Lato"/>
-                <a:ea typeface="Lato"/>
-                <a:cs typeface="Lato"/>
-                <a:sym typeface="Lato"/>
-              </a:rPr>
-              <a:t>client (pour que tous les visiteurs puissent voir une vrais disponibilité des vélos et en temps réel)</a:t>
-            </a:r>
-            <a:endParaRPr sz="1800">
-              <a:latin typeface="Lato"/>
-              <a:ea typeface="Lato"/>
-              <a:cs typeface="Lato"/>
-              <a:sym typeface="Lato"/>
-            </a:endParaRPr>
-          </a:p>
-          <a:p>
-            <a:pPr marL="457200" lvl="0" indent="-342900" algn="l" rtl="0">
-              <a:lnSpc>
-                <a:spcPct val="150000"/>
-              </a:lnSpc>
-              <a:spcBef>
-                <a:spcPts val="0"/>
-              </a:spcBef>
-              <a:spcAft>
-                <a:spcPts val="0"/>
-              </a:spcAft>
-              <a:buSzPts val="1800"/>
-              <a:buFont typeface="Lato"/>
-              <a:buChar char="➔"/>
-            </a:pPr>
-            <a:r>
-              <a:rPr lang="fr" sz="1800">
-                <a:latin typeface="Lato"/>
-                <a:ea typeface="Lato"/>
-                <a:cs typeface="Lato"/>
-                <a:sym typeface="Lato"/>
-              </a:rPr>
-              <a:t>Refonte graphique </a:t>
-            </a:r>
-            <a:endParaRPr sz="1800">
-              <a:latin typeface="Lato"/>
-              <a:ea typeface="Lato"/>
-              <a:cs typeface="Lato"/>
-              <a:sym typeface="Lato"/>
-            </a:endParaRPr>
-          </a:p>
-          <a:p>
-            <a:pPr marL="457200" lvl="0" indent="-342900" algn="l" rtl="0">
-              <a:lnSpc>
-                <a:spcPct val="150000"/>
-              </a:lnSpc>
-              <a:spcBef>
-                <a:spcPts val="0"/>
-              </a:spcBef>
-              <a:spcAft>
-                <a:spcPts val="0"/>
-              </a:spcAft>
-              <a:buSzPts val="1800"/>
-              <a:buFont typeface="Lato"/>
-              <a:buChar char="➔"/>
-            </a:pPr>
-            <a:r>
-              <a:rPr lang="fr" sz="1800">
-                <a:latin typeface="Lato"/>
-                <a:ea typeface="Lato"/>
-                <a:cs typeface="Lato"/>
-                <a:sym typeface="Lato"/>
-              </a:rPr>
-              <a:t>Uniformisation des techniques utilisées dans le code</a:t>
-            </a:r>
-            <a:endParaRPr sz="1800">
-              <a:latin typeface="Lato"/>
-              <a:ea typeface="Lato"/>
-              <a:cs typeface="Lato"/>
-              <a:sym typeface="Lato"/>
-            </a:endParaRPr>
-          </a:p>
-        </p:txBody>
-      </p:sp>
-    </p:spTree>
-  </p:cSld>
-  <p:clrMapOvr>
-    <a:masterClrMapping/>
-  </p:clrMapOvr>
-</p:sld>
-</file>
-
-<file path=ppt/slides/slide21.xml><?xml version="1.0" encoding="utf-8"?>
 <p:sld xmlns:a="http://schemas.openxmlformats.org/drawingml/2006/main" xmlns:r="http://schemas.openxmlformats.org/officeDocument/2006/relationships" xmlns:p="http://schemas.openxmlformats.org/presentationml/2006/main">
   <p:cSld>
     <p:spTree>
@@ -11411,6 +9857,235 @@
 </p:sld>
 </file>
 
+<file path=ppt/slides/slide2.xml><?xml version="1.0" encoding="utf-8"?>
+<p:sld xmlns:a="http://schemas.openxmlformats.org/drawingml/2006/main" xmlns:r="http://schemas.openxmlformats.org/officeDocument/2006/relationships" xmlns:p="http://schemas.openxmlformats.org/presentationml/2006/main">
+  <p:cSld>
+    <p:spTree>
+      <p:nvGrpSpPr>
+        <p:cNvPr id="1" name="Shape 78"/>
+        <p:cNvGrpSpPr/>
+        <p:nvPr/>
+      </p:nvGrpSpPr>
+      <p:grpSpPr>
+        <a:xfrm>
+          <a:off x="0" y="0"/>
+          <a:ext cx="0" cy="0"/>
+          <a:chOff x="0" y="0"/>
+          <a:chExt cx="0" cy="0"/>
+        </a:xfrm>
+      </p:grpSpPr>
+      <p:sp>
+        <p:nvSpPr>
+          <p:cNvPr id="79" name="Google Shape;79;p14"/>
+          <p:cNvSpPr txBox="1">
+            <a:spLocks noGrp="1"/>
+          </p:cNvSpPr>
+          <p:nvPr>
+            <p:ph type="title"/>
+          </p:nvPr>
+        </p:nvSpPr>
+        <p:spPr>
+          <a:xfrm>
+            <a:off x="1688750" y="412875"/>
+            <a:ext cx="6321600" cy="635400"/>
+          </a:xfrm>
+          <a:prstGeom prst="rect">
+            <a:avLst/>
+          </a:prstGeom>
+        </p:spPr>
+        <p:txBody>
+          <a:bodyPr spcFirstLastPara="1" wrap="square" lIns="91425" tIns="91425" rIns="91425" bIns="91425" anchor="t" anchorCtr="0">
+            <a:noAutofit/>
+          </a:bodyPr>
+          <a:lstStyle/>
+          <a:p>
+            <a:pPr marL="0" lvl="0" indent="0" algn="ctr" rtl="0">
+              <a:spcBef>
+                <a:spcPts val="0"/>
+              </a:spcBef>
+              <a:spcAft>
+                <a:spcPts val="0"/>
+              </a:spcAft>
+              <a:buNone/>
+            </a:pPr>
+            <a:r>
+              <a:rPr lang="fr" dirty="0">
+                <a:solidFill>
+                  <a:srgbClr val="E69138"/>
+                </a:solidFill>
+              </a:rPr>
+              <a:t>Plan de la présentation</a:t>
+            </a:r>
+            <a:r>
+              <a:rPr lang="fr" dirty="0"/>
+              <a:t> </a:t>
+            </a:r>
+            <a:endParaRPr dirty="0"/>
+          </a:p>
+        </p:txBody>
+      </p:sp>
+      <p:sp>
+        <p:nvSpPr>
+          <p:cNvPr id="80" name="Google Shape;80;p14"/>
+          <p:cNvSpPr txBox="1">
+            <a:spLocks noGrp="1"/>
+          </p:cNvSpPr>
+          <p:nvPr>
+            <p:ph type="body" idx="1"/>
+          </p:nvPr>
+        </p:nvSpPr>
+        <p:spPr>
+          <a:xfrm>
+            <a:off x="1291550" y="974150"/>
+            <a:ext cx="7116000" cy="3724800"/>
+          </a:xfrm>
+          <a:prstGeom prst="rect">
+            <a:avLst/>
+          </a:prstGeom>
+        </p:spPr>
+        <p:txBody>
+          <a:bodyPr spcFirstLastPara="1" wrap="square" lIns="91425" tIns="91425" rIns="91425" bIns="91425" anchor="t" anchorCtr="0">
+            <a:noAutofit/>
+          </a:bodyPr>
+          <a:lstStyle/>
+          <a:p>
+            <a:pPr marL="457200" lvl="0" indent="-355600" algn="l" rtl="0">
+              <a:lnSpc>
+                <a:spcPct val="150000"/>
+              </a:lnSpc>
+              <a:spcBef>
+                <a:spcPts val="0"/>
+              </a:spcBef>
+              <a:spcAft>
+                <a:spcPts val="0"/>
+              </a:spcAft>
+              <a:buSzPts val="2000"/>
+              <a:buChar char="➢"/>
+            </a:pPr>
+            <a:r>
+              <a:rPr lang="fr" dirty="0" smtClean="0"/>
+              <a:t>L’objectif </a:t>
+            </a:r>
+            <a:r>
+              <a:rPr lang="fr" dirty="0"/>
+              <a:t>de la </a:t>
+            </a:r>
+            <a:r>
+              <a:rPr lang="fr" dirty="0" smtClean="0"/>
+              <a:t>mission</a:t>
+            </a:r>
+          </a:p>
+          <a:p>
+            <a:pPr marL="457200" lvl="0" indent="-355600" algn="l" rtl="0">
+              <a:lnSpc>
+                <a:spcPct val="150000"/>
+              </a:lnSpc>
+              <a:spcBef>
+                <a:spcPts val="0"/>
+              </a:spcBef>
+              <a:spcAft>
+                <a:spcPts val="0"/>
+              </a:spcAft>
+              <a:buSzPts val="2000"/>
+              <a:buChar char="➢"/>
+            </a:pPr>
+            <a:r>
+              <a:rPr lang="fr" dirty="0" smtClean="0"/>
+              <a:t>L’architecture MVC</a:t>
+            </a:r>
+          </a:p>
+          <a:p>
+            <a:pPr marL="457200" lvl="0" indent="-355600" algn="l" rtl="0">
+              <a:lnSpc>
+                <a:spcPct val="150000"/>
+              </a:lnSpc>
+              <a:spcBef>
+                <a:spcPts val="0"/>
+              </a:spcBef>
+              <a:spcAft>
+                <a:spcPts val="0"/>
+              </a:spcAft>
+              <a:buSzPts val="2000"/>
+              <a:buChar char="➢"/>
+            </a:pPr>
+            <a:r>
+              <a:rPr lang="fr-FR" dirty="0" smtClean="0"/>
+              <a:t>L</a:t>
+            </a:r>
+            <a:r>
+              <a:rPr lang="fr" dirty="0" smtClean="0"/>
+              <a:t>e CRUD</a:t>
+            </a:r>
+          </a:p>
+          <a:p>
+            <a:pPr marL="457200" lvl="0" indent="-355600" algn="l" rtl="0">
+              <a:lnSpc>
+                <a:spcPct val="150000"/>
+              </a:lnSpc>
+              <a:spcBef>
+                <a:spcPts val="0"/>
+              </a:spcBef>
+              <a:spcAft>
+                <a:spcPts val="0"/>
+              </a:spcAft>
+              <a:buSzPts val="2000"/>
+              <a:buChar char="➢"/>
+            </a:pPr>
+            <a:r>
+              <a:rPr lang="fr" dirty="0" smtClean="0"/>
+              <a:t>L’espace membre</a:t>
+            </a:r>
+            <a:endParaRPr dirty="0"/>
+          </a:p>
+          <a:p>
+            <a:pPr marL="457200" lvl="0" indent="-355600" algn="l" rtl="0">
+              <a:lnSpc>
+                <a:spcPct val="150000"/>
+              </a:lnSpc>
+              <a:spcBef>
+                <a:spcPts val="0"/>
+              </a:spcBef>
+              <a:spcAft>
+                <a:spcPts val="0"/>
+              </a:spcAft>
+              <a:buSzPts val="2000"/>
+              <a:buChar char="➢"/>
+            </a:pPr>
+            <a:r>
+              <a:rPr lang="fr" dirty="0" smtClean="0"/>
+              <a:t>Les difficultés rencontrées</a:t>
+            </a:r>
+          </a:p>
+          <a:p>
+            <a:pPr marL="457200" lvl="0" indent="-355600" algn="l" rtl="0">
+              <a:lnSpc>
+                <a:spcPct val="150000"/>
+              </a:lnSpc>
+              <a:spcBef>
+                <a:spcPts val="0"/>
+              </a:spcBef>
+              <a:spcAft>
+                <a:spcPts val="0"/>
+              </a:spcAft>
+              <a:buSzPts val="2000"/>
+              <a:buChar char="➢"/>
+            </a:pPr>
+            <a:r>
+              <a:rPr lang="fr" dirty="0" smtClean="0"/>
+              <a:t>Une petite démonstration du site </a:t>
+            </a:r>
+            <a:endParaRPr dirty="0"/>
+          </a:p>
+        </p:txBody>
+      </p:sp>
+    </p:spTree>
+  </p:cSld>
+  <p:clrMapOvr>
+    <a:masterClrMapping/>
+  </p:clrMapOvr>
+</p:sld>
+</file>
+
 <file path=ppt/slides/slide3.xml><?xml version="1.0" encoding="utf-8"?>
 <p:sld xmlns:a="http://schemas.openxmlformats.org/drawingml/2006/main" xmlns:r="http://schemas.openxmlformats.org/officeDocument/2006/relationships" xmlns:p="http://schemas.openxmlformats.org/presentationml/2006/main">
   <p:cSld>
@@ -11469,7 +10144,7 @@
               <a:buNone/>
             </a:pPr>
             <a:r>
-              <a:rPr lang="fr" sz="3600" b="0" dirty="0">
+              <a:rPr lang="fr" sz="3600" b="0" dirty="0" smtClean="0">
                 <a:solidFill>
                   <a:schemeClr val="dk1"/>
                 </a:solidFill>
@@ -11478,19 +10153,7 @@
                 <a:cs typeface="Lato"/>
                 <a:sym typeface="Lato"/>
               </a:rPr>
-              <a:t>O</a:t>
-            </a:r>
-            <a:r>
-              <a:rPr lang="fr" sz="3600" b="0" dirty="0" smtClean="0">
-                <a:solidFill>
-                  <a:schemeClr val="dk1"/>
-                </a:solidFill>
-                <a:latin typeface="Lato"/>
-                <a:ea typeface="Lato"/>
-                <a:cs typeface="Lato"/>
-                <a:sym typeface="Lato"/>
-              </a:rPr>
-              <a:t>bjectif </a:t>
+              <a:t>L’objectif </a:t>
             </a:r>
             <a:r>
               <a:rPr lang="fr" sz="3600" b="0" dirty="0">
@@ -11537,458 +10200,209 @@
           <a:chExt cx="0" cy="0"/>
         </a:xfrm>
       </p:grpSpPr>
-      <p:pic>
-        <p:nvPicPr>
-          <p:cNvPr id="90" name="Google Shape;90;p16"/>
-          <p:cNvPicPr preferRelativeResize="0"/>
-          <p:nvPr/>
-        </p:nvPicPr>
-        <p:blipFill rotWithShape="1">
-          <a:blip r:embed="rId3">
-            <a:alphaModFix/>
-          </a:blip>
-          <a:srcRect l="-89" t="430" r="90" b="-429"/>
-          <a:stretch/>
-        </p:blipFill>
-        <p:spPr>
-          <a:xfrm>
-            <a:off x="1039975" y="533625"/>
-            <a:ext cx="6238000" cy="4091075"/>
-          </a:xfrm>
-          <a:prstGeom prst="rect">
-            <a:avLst/>
-          </a:prstGeom>
-          <a:noFill/>
-          <a:ln>
-            <a:noFill/>
-          </a:ln>
-        </p:spPr>
-      </p:pic>
       <p:sp>
         <p:nvSpPr>
-          <p:cNvPr id="91" name="Google Shape;91;p16"/>
+          <p:cNvPr id="3" name="Rectangle 2"/>
           <p:cNvSpPr/>
           <p:nvPr/>
         </p:nvSpPr>
         <p:spPr>
           <a:xfrm>
-            <a:off x="5795675" y="667050"/>
-            <a:ext cx="1482300" cy="385500"/>
-          </a:xfrm>
-          <a:prstGeom prst="leftArrow">
-            <a:avLst>
-              <a:gd name="adj1" fmla="val 50000"/>
-              <a:gd name="adj2" fmla="val 50000"/>
-            </a:avLst>
-          </a:prstGeom>
-          <a:solidFill>
-            <a:schemeClr val="lt2"/>
-          </a:solidFill>
-          <a:ln w="9525" cap="flat" cmpd="sng">
-            <a:solidFill>
-              <a:schemeClr val="dk2"/>
-            </a:solidFill>
-            <a:prstDash val="solid"/>
-            <a:round/>
-            <a:headEnd type="none" w="sm" len="sm"/>
-            <a:tailEnd type="none" w="sm" len="sm"/>
-          </a:ln>
-        </p:spPr>
-        <p:txBody>
-          <a:bodyPr spcFirstLastPara="1" wrap="square" lIns="91425" tIns="91425" rIns="91425" bIns="91425" anchor="ctr" anchorCtr="0">
-            <a:noAutofit/>
-          </a:bodyPr>
-          <a:lstStyle/>
-          <a:p>
-            <a:pPr marL="0" lvl="0" indent="0" algn="l" rtl="0">
-              <a:spcBef>
-                <a:spcPts val="0"/>
-              </a:spcBef>
-              <a:spcAft>
-                <a:spcPts val="0"/>
-              </a:spcAft>
-              <a:buNone/>
-            </a:pPr>
-            <a:endParaRPr/>
-          </a:p>
-        </p:txBody>
-      </p:sp>
-      <p:sp>
-        <p:nvSpPr>
-          <p:cNvPr id="92" name="Google Shape;92;p16"/>
-          <p:cNvSpPr/>
-          <p:nvPr/>
-        </p:nvSpPr>
-        <p:spPr>
-          <a:xfrm>
-            <a:off x="1823200" y="3764975"/>
-            <a:ext cx="355800" cy="681900"/>
-          </a:xfrm>
-          <a:prstGeom prst="upArrow">
-            <a:avLst>
-              <a:gd name="adj1" fmla="val 50000"/>
-              <a:gd name="adj2" fmla="val 50000"/>
-            </a:avLst>
-          </a:prstGeom>
-          <a:solidFill>
-            <a:schemeClr val="lt2"/>
-          </a:solidFill>
-          <a:ln w="9525" cap="flat" cmpd="sng">
-            <a:solidFill>
-              <a:schemeClr val="dk2"/>
-            </a:solidFill>
-            <a:prstDash val="solid"/>
-            <a:round/>
-            <a:headEnd type="none" w="sm" len="sm"/>
-            <a:tailEnd type="none" w="sm" len="sm"/>
-          </a:ln>
-        </p:spPr>
-        <p:txBody>
-          <a:bodyPr spcFirstLastPara="1" wrap="square" lIns="91425" tIns="91425" rIns="91425" bIns="91425" anchor="ctr" anchorCtr="0">
-            <a:noAutofit/>
-          </a:bodyPr>
-          <a:lstStyle/>
-          <a:p>
-            <a:pPr marL="0" lvl="0" indent="0" algn="l" rtl="0">
-              <a:spcBef>
-                <a:spcPts val="0"/>
-              </a:spcBef>
-              <a:spcAft>
-                <a:spcPts val="0"/>
-              </a:spcAft>
-              <a:buNone/>
-            </a:pPr>
-            <a:endParaRPr/>
-          </a:p>
-        </p:txBody>
-      </p:sp>
-      <p:sp>
-        <p:nvSpPr>
-          <p:cNvPr id="93" name="Google Shape;93;p16"/>
-          <p:cNvSpPr/>
-          <p:nvPr/>
-        </p:nvSpPr>
-        <p:spPr>
-          <a:xfrm>
-            <a:off x="5795550" y="2312350"/>
-            <a:ext cx="1482300" cy="385500"/>
-          </a:xfrm>
-          <a:prstGeom prst="leftArrow">
-            <a:avLst>
-              <a:gd name="adj1" fmla="val 50000"/>
-              <a:gd name="adj2" fmla="val 50000"/>
-            </a:avLst>
-          </a:prstGeom>
-          <a:solidFill>
-            <a:schemeClr val="lt2"/>
-          </a:solidFill>
-          <a:ln w="9525" cap="flat" cmpd="sng">
-            <a:solidFill>
-              <a:schemeClr val="dk2"/>
-            </a:solidFill>
-            <a:prstDash val="solid"/>
-            <a:round/>
-            <a:headEnd type="none" w="sm" len="sm"/>
-            <a:tailEnd type="none" w="sm" len="sm"/>
-          </a:ln>
-        </p:spPr>
-        <p:txBody>
-          <a:bodyPr spcFirstLastPara="1" wrap="square" lIns="91425" tIns="91425" rIns="91425" bIns="91425" anchor="ctr" anchorCtr="0">
-            <a:noAutofit/>
-          </a:bodyPr>
-          <a:lstStyle/>
-          <a:p>
-            <a:pPr marL="0" lvl="0" indent="0" algn="l" rtl="0">
-              <a:spcBef>
-                <a:spcPts val="0"/>
-              </a:spcBef>
-              <a:spcAft>
-                <a:spcPts val="0"/>
-              </a:spcAft>
-              <a:buNone/>
-            </a:pPr>
-            <a:endParaRPr/>
-          </a:p>
-        </p:txBody>
-      </p:sp>
-      <p:sp>
-        <p:nvSpPr>
-          <p:cNvPr id="94" name="Google Shape;94;p16"/>
-          <p:cNvSpPr/>
-          <p:nvPr/>
-        </p:nvSpPr>
-        <p:spPr>
-          <a:xfrm>
-            <a:off x="7277850" y="3957700"/>
-            <a:ext cx="1008000" cy="385500"/>
-          </a:xfrm>
-          <a:prstGeom prst="leftArrow">
-            <a:avLst>
-              <a:gd name="adj1" fmla="val 50000"/>
-              <a:gd name="adj2" fmla="val 50000"/>
-            </a:avLst>
-          </a:prstGeom>
-          <a:solidFill>
-            <a:schemeClr val="lt2"/>
-          </a:solidFill>
-          <a:ln w="9525" cap="flat" cmpd="sng">
-            <a:solidFill>
-              <a:schemeClr val="dk2"/>
-            </a:solidFill>
-            <a:prstDash val="solid"/>
-            <a:round/>
-            <a:headEnd type="none" w="sm" len="sm"/>
-            <a:tailEnd type="none" w="sm" len="sm"/>
-          </a:ln>
-        </p:spPr>
-        <p:txBody>
-          <a:bodyPr spcFirstLastPara="1" wrap="square" lIns="91425" tIns="91425" rIns="91425" bIns="91425" anchor="ctr" anchorCtr="0">
-            <a:noAutofit/>
-          </a:bodyPr>
-          <a:lstStyle/>
-          <a:p>
-            <a:pPr marL="0" lvl="0" indent="0" algn="l" rtl="0">
-              <a:spcBef>
-                <a:spcPts val="0"/>
-              </a:spcBef>
-              <a:spcAft>
-                <a:spcPts val="0"/>
-              </a:spcAft>
-              <a:buNone/>
-            </a:pPr>
-            <a:endParaRPr/>
-          </a:p>
-        </p:txBody>
-      </p:sp>
-      <p:sp>
-        <p:nvSpPr>
-          <p:cNvPr id="95" name="Google Shape;95;p16"/>
-          <p:cNvSpPr txBox="1"/>
-          <p:nvPr/>
-        </p:nvSpPr>
-        <p:spPr>
-          <a:xfrm>
-            <a:off x="7409350" y="667050"/>
-            <a:ext cx="1106700" cy="385500"/>
+            <a:off x="699797" y="947871"/>
+            <a:ext cx="7781730" cy="3970318"/>
           </a:xfrm>
           <a:prstGeom prst="rect">
             <a:avLst/>
           </a:prstGeom>
-          <a:noFill/>
-          <a:ln>
-            <a:noFill/>
-          </a:ln>
         </p:spPr>
         <p:txBody>
-          <a:bodyPr spcFirstLastPara="1" wrap="square" lIns="91425" tIns="91425" rIns="91425" bIns="91425" anchor="t" anchorCtr="0">
-            <a:noAutofit/>
+          <a:bodyPr wrap="square">
+            <a:spAutoFit/>
           </a:bodyPr>
           <a:lstStyle/>
           <a:p>
-            <a:pPr marL="0" lvl="0" indent="0" algn="l" rtl="0">
-              <a:spcBef>
-                <a:spcPts val="0"/>
-              </a:spcBef>
-              <a:spcAft>
-                <a:spcPts val="0"/>
-              </a:spcAft>
-              <a:buNone/>
+            <a:pPr marL="285750" indent="-285750">
+              <a:lnSpc>
+                <a:spcPct val="150000"/>
+              </a:lnSpc>
+              <a:buFont typeface="Wingdings" pitchFamily="2" charset="2"/>
+              <a:buChar char="Ø"/>
             </a:pPr>
             <a:r>
-              <a:rPr lang="fr">
-                <a:solidFill>
-                  <a:schemeClr val="dk1"/>
-                </a:solidFill>
-                <a:latin typeface="Lato"/>
-                <a:ea typeface="Lato"/>
-                <a:cs typeface="Lato"/>
-                <a:sym typeface="Lato"/>
-              </a:rPr>
-              <a:t>Diaporama</a:t>
+              <a:rPr lang="fr-FR" dirty="0" smtClean="0"/>
+              <a:t>Développer </a:t>
             </a:r>
-            <a:endParaRPr>
-              <a:solidFill>
-                <a:schemeClr val="dk1"/>
-              </a:solidFill>
-              <a:latin typeface="Lato"/>
-              <a:ea typeface="Lato"/>
-              <a:cs typeface="Lato"/>
-              <a:sym typeface="Lato"/>
-            </a:endParaRPr>
+            <a:r>
+              <a:rPr lang="fr-FR" dirty="0"/>
+              <a:t>une application de blog simple en PHP et avec une base de données </a:t>
+            </a:r>
+            <a:r>
+              <a:rPr lang="fr-FR" dirty="0" smtClean="0"/>
+              <a:t>MySQL avec </a:t>
+            </a:r>
+            <a:r>
+              <a:rPr lang="fr-FR" dirty="0"/>
+              <a:t>interface </a:t>
+            </a:r>
+            <a:r>
+              <a:rPr lang="fr-FR" dirty="0" err="1" smtClean="0"/>
+              <a:t>backend</a:t>
+            </a:r>
+            <a:r>
+              <a:rPr lang="fr-FR" dirty="0" smtClean="0"/>
+              <a:t> (</a:t>
+            </a:r>
+            <a:r>
+              <a:rPr lang="fr-FR" dirty="0"/>
+              <a:t>administration des </a:t>
+            </a:r>
+            <a:r>
+              <a:rPr lang="fr-FR" dirty="0" smtClean="0"/>
+              <a:t>chapitres </a:t>
+            </a:r>
+            <a:r>
+              <a:rPr lang="fr-FR" dirty="0"/>
+              <a:t>pour </a:t>
+            </a:r>
+            <a:r>
+              <a:rPr lang="fr-FR" dirty="0" smtClean="0"/>
+              <a:t>l'écriture)</a:t>
+            </a:r>
           </a:p>
-        </p:txBody>
-      </p:sp>
-      <p:sp>
-        <p:nvSpPr>
-          <p:cNvPr id="96" name="Google Shape;96;p16"/>
-          <p:cNvSpPr txBox="1"/>
-          <p:nvPr/>
-        </p:nvSpPr>
-        <p:spPr>
-          <a:xfrm>
-            <a:off x="7561750" y="2312374"/>
-            <a:ext cx="1106700" cy="681900"/>
-          </a:xfrm>
-          <a:prstGeom prst="rect">
-            <a:avLst/>
-          </a:prstGeom>
-          <a:noFill/>
-          <a:ln>
-            <a:noFill/>
-          </a:ln>
-        </p:spPr>
-        <p:txBody>
-          <a:bodyPr spcFirstLastPara="1" wrap="square" lIns="91425" tIns="91425" rIns="91425" bIns="91425" anchor="t" anchorCtr="0">
-            <a:noAutofit/>
-          </a:bodyPr>
-          <a:lstStyle/>
           <a:p>
-            <a:pPr marL="0" lvl="0" indent="0" algn="l" rtl="0">
-              <a:spcBef>
-                <a:spcPts val="0"/>
-              </a:spcBef>
-              <a:spcAft>
-                <a:spcPts val="0"/>
-              </a:spcAft>
-              <a:buNone/>
+            <a:pPr marL="285750" indent="-285750">
+              <a:lnSpc>
+                <a:spcPct val="150000"/>
+              </a:lnSpc>
+              <a:buFont typeface="Wingdings" pitchFamily="2" charset="2"/>
+              <a:buChar char="Ø"/>
+            </a:pPr>
+            <a:endParaRPr lang="fr-FR" dirty="0"/>
+          </a:p>
+          <a:p>
+            <a:pPr marL="285750" indent="-285750">
+              <a:lnSpc>
+                <a:spcPct val="150000"/>
+              </a:lnSpc>
+              <a:buFont typeface="Wingdings" pitchFamily="2" charset="2"/>
+              <a:buChar char="Ø"/>
             </a:pPr>
             <a:r>
-              <a:rPr lang="fr">
-                <a:solidFill>
-                  <a:schemeClr val="dk1"/>
-                </a:solidFill>
-                <a:latin typeface="Lato"/>
-                <a:ea typeface="Lato"/>
-                <a:cs typeface="Lato"/>
-                <a:sym typeface="Lato"/>
-              </a:rPr>
-              <a:t>Carte de réservation</a:t>
+              <a:rPr lang="fr-FR" dirty="0" smtClean="0"/>
+              <a:t>L’interface </a:t>
             </a:r>
-            <a:endParaRPr>
-              <a:solidFill>
-                <a:schemeClr val="dk1"/>
-              </a:solidFill>
-              <a:latin typeface="Lato"/>
-              <a:ea typeface="Lato"/>
-              <a:cs typeface="Lato"/>
-              <a:sym typeface="Lato"/>
-            </a:endParaRPr>
+            <a:r>
+              <a:rPr lang="fr-FR" dirty="0" err="1" smtClean="0"/>
+              <a:t>backend</a:t>
+            </a:r>
+            <a:r>
+              <a:rPr lang="fr-FR" dirty="0" smtClean="0"/>
+              <a:t> doit contenir tous les éléments d’un CRUD</a:t>
+            </a:r>
           </a:p>
-        </p:txBody>
-      </p:sp>
-      <p:sp>
-        <p:nvSpPr>
-          <p:cNvPr id="97" name="Google Shape;97;p16"/>
-          <p:cNvSpPr txBox="1"/>
-          <p:nvPr/>
-        </p:nvSpPr>
-        <p:spPr>
-          <a:xfrm>
-            <a:off x="1447750" y="4446875"/>
-            <a:ext cx="1106700" cy="385500"/>
-          </a:xfrm>
-          <a:prstGeom prst="rect">
-            <a:avLst/>
-          </a:prstGeom>
-          <a:noFill/>
-          <a:ln>
-            <a:noFill/>
-          </a:ln>
-        </p:spPr>
-        <p:txBody>
-          <a:bodyPr spcFirstLastPara="1" wrap="square" lIns="91425" tIns="91425" rIns="91425" bIns="91425" anchor="t" anchorCtr="0">
-            <a:noAutofit/>
-          </a:bodyPr>
-          <a:lstStyle/>
           <a:p>
-            <a:pPr marL="0" lvl="0" indent="0" algn="ctr" rtl="0">
-              <a:spcBef>
-                <a:spcPts val="0"/>
-              </a:spcBef>
-              <a:spcAft>
-                <a:spcPts val="0"/>
-              </a:spcAft>
-              <a:buNone/>
+            <a:pPr marL="285750" indent="-285750">
+              <a:lnSpc>
+                <a:spcPct val="150000"/>
+              </a:lnSpc>
+              <a:buFont typeface="Wingdings" pitchFamily="2" charset="2"/>
+              <a:buChar char="Ø"/>
+            </a:pPr>
+            <a:endParaRPr lang="fr-FR" dirty="0"/>
+          </a:p>
+          <a:p>
+            <a:pPr marL="285750" indent="-285750">
+              <a:lnSpc>
+                <a:spcPct val="150000"/>
+              </a:lnSpc>
+              <a:buFont typeface="Wingdings" pitchFamily="2" charset="2"/>
+              <a:buChar char="Ø"/>
             </a:pPr>
             <a:r>
-              <a:rPr lang="fr">
-                <a:solidFill>
-                  <a:schemeClr val="dk1"/>
-                </a:solidFill>
-                <a:latin typeface="Lato"/>
-                <a:ea typeface="Lato"/>
-                <a:cs typeface="Lato"/>
-                <a:sym typeface="Lato"/>
-              </a:rPr>
-              <a:t>Carte</a:t>
+              <a:rPr lang="fr-FR" dirty="0" smtClean="0"/>
+              <a:t>Chaque chapitres doit </a:t>
             </a:r>
-            <a:endParaRPr>
-              <a:solidFill>
-                <a:schemeClr val="dk1"/>
-              </a:solidFill>
-              <a:latin typeface="Lato"/>
-              <a:ea typeface="Lato"/>
-              <a:cs typeface="Lato"/>
-              <a:sym typeface="Lato"/>
-            </a:endParaRPr>
+            <a:r>
+              <a:rPr lang="fr-FR" dirty="0"/>
+              <a:t>permettre l'ajout de </a:t>
+            </a:r>
+            <a:r>
+              <a:rPr lang="fr-FR" dirty="0" smtClean="0"/>
+              <a:t>commentaires, </a:t>
+            </a:r>
+            <a:r>
+              <a:rPr lang="fr-FR" dirty="0"/>
+              <a:t>qui pourront être modérés dans l'interface </a:t>
+            </a:r>
+            <a:r>
+              <a:rPr lang="fr-FR" dirty="0" smtClean="0"/>
+              <a:t>d'administration au cas de signale par exemple</a:t>
+            </a:r>
           </a:p>
-        </p:txBody>
-      </p:sp>
-      <p:sp>
-        <p:nvSpPr>
-          <p:cNvPr id="98" name="Google Shape;98;p16"/>
-          <p:cNvSpPr txBox="1"/>
-          <p:nvPr/>
-        </p:nvSpPr>
-        <p:spPr>
-          <a:xfrm>
-            <a:off x="7910875" y="3572200"/>
-            <a:ext cx="757500" cy="385500"/>
-          </a:xfrm>
-          <a:prstGeom prst="rect">
-            <a:avLst/>
-          </a:prstGeom>
-          <a:noFill/>
-          <a:ln>
-            <a:noFill/>
-          </a:ln>
-        </p:spPr>
-        <p:txBody>
-          <a:bodyPr spcFirstLastPara="1" wrap="square" lIns="91425" tIns="91425" rIns="91425" bIns="91425" anchor="t" anchorCtr="0">
-            <a:noAutofit/>
-          </a:bodyPr>
-          <a:lstStyle/>
           <a:p>
-            <a:pPr marL="0" lvl="0" indent="0" algn="l" rtl="0">
-              <a:spcBef>
-                <a:spcPts val="0"/>
-              </a:spcBef>
-              <a:spcAft>
-                <a:spcPts val="0"/>
-              </a:spcAft>
-              <a:buNone/>
+            <a:pPr marL="285750" indent="-285750">
+              <a:lnSpc>
+                <a:spcPct val="150000"/>
+              </a:lnSpc>
+              <a:buFont typeface="Wingdings" pitchFamily="2" charset="2"/>
+              <a:buChar char="Ø"/>
+            </a:pPr>
+            <a:endParaRPr lang="fr-FR" dirty="0"/>
+          </a:p>
+          <a:p>
+            <a:pPr marL="285750" indent="-285750">
+              <a:lnSpc>
+                <a:spcPct val="150000"/>
+              </a:lnSpc>
+              <a:buFont typeface="Wingdings" pitchFamily="2" charset="2"/>
+              <a:buChar char="Ø"/>
             </a:pPr>
             <a:r>
-              <a:rPr lang="fr">
-                <a:solidFill>
-                  <a:schemeClr val="dk1"/>
-                </a:solidFill>
-                <a:latin typeface="Lato"/>
-                <a:ea typeface="Lato"/>
-                <a:cs typeface="Lato"/>
-                <a:sym typeface="Lato"/>
-              </a:rPr>
-              <a:t>Canvas</a:t>
+              <a:rPr lang="fr-FR" dirty="0" smtClean="0"/>
+              <a:t>L'interface d'administration </a:t>
             </a:r>
-            <a:endParaRPr>
-              <a:solidFill>
-                <a:schemeClr val="dk1"/>
-              </a:solidFill>
-              <a:latin typeface="Lato"/>
-              <a:ea typeface="Lato"/>
-              <a:cs typeface="Lato"/>
-              <a:sym typeface="Lato"/>
-            </a:endParaRPr>
+            <a:r>
+              <a:rPr lang="fr-FR" dirty="0"/>
+              <a:t>sera protégée </a:t>
+            </a:r>
+            <a:r>
+              <a:rPr lang="fr-FR" dirty="0" smtClean="0"/>
+              <a:t>par un </a:t>
+            </a:r>
+            <a:r>
+              <a:rPr lang="fr-FR" dirty="0"/>
+              <a:t>mot de passe. La rédaction de billets se fera dans une interface WYSIWYG basée sur </a:t>
+            </a:r>
+            <a:r>
+              <a:rPr lang="fr-FR" dirty="0" err="1" smtClean="0"/>
+              <a:t>TinyMCE</a:t>
+            </a:r>
+            <a:r>
+              <a:rPr lang="fr-FR" dirty="0" smtClean="0"/>
+              <a:t>,</a:t>
+            </a:r>
+            <a:endParaRPr lang="fr-FR" dirty="0"/>
+          </a:p>
+          <a:p>
+            <a:pPr marL="285750" indent="-285750">
+              <a:buFont typeface="Wingdings" pitchFamily="2" charset="2"/>
+              <a:buChar char="Ø"/>
+            </a:pPr>
+            <a:endParaRPr lang="fr-FR" dirty="0" smtClean="0"/>
+          </a:p>
+          <a:p>
+            <a:pPr marL="285750" indent="-285750">
+              <a:buFont typeface="Wingdings" pitchFamily="2" charset="2"/>
+              <a:buChar char="Ø"/>
+            </a:pPr>
+            <a:endParaRPr lang="fr-FR" dirty="0" smtClean="0"/>
+          </a:p>
+          <a:p>
+            <a:pPr marL="285750" indent="-285750">
+              <a:buFont typeface="Wingdings" pitchFamily="2" charset="2"/>
+              <a:buChar char="Ø"/>
+            </a:pPr>
+            <a:endParaRPr lang="fr-FR" dirty="0"/>
           </a:p>
         </p:txBody>
       </p:sp>
@@ -12029,8 +10443,8 @@
         </p:nvSpPr>
         <p:spPr>
           <a:xfrm>
-            <a:off x="696675" y="978325"/>
-            <a:ext cx="8286000" cy="830100"/>
+            <a:off x="668683" y="1931437"/>
+            <a:ext cx="8286000" cy="1108629"/>
           </a:xfrm>
           <a:prstGeom prst="rect">
             <a:avLst/>
@@ -12058,18 +10472,14 @@
               <a:buNone/>
             </a:pPr>
             <a:r>
-              <a:rPr lang="fr" sz="3600" b="0">
+              <a:rPr lang="fr-FR" sz="3600" dirty="0" smtClean="0">
                 <a:solidFill>
                   <a:schemeClr val="dk1"/>
                 </a:solidFill>
-                <a:latin typeface="Lato"/>
-                <a:ea typeface="Lato"/>
-                <a:cs typeface="Lato"/>
-                <a:sym typeface="Lato"/>
               </a:rPr>
-              <a:t>Diaporama</a:t>
+              <a:t>L’architecture MVC</a:t>
             </a:r>
-            <a:endParaRPr sz="3600">
+            <a:endParaRPr sz="3600" dirty="0">
               <a:solidFill>
                 <a:schemeClr val="dk1"/>
               </a:solidFill>
@@ -12077,34 +10487,6 @@
           </a:p>
         </p:txBody>
       </p:sp>
-      <p:pic>
-        <p:nvPicPr>
-          <p:cNvPr id="104" name="Google Shape;104;p17"/>
-          <p:cNvPicPr preferRelativeResize="0"/>
-          <p:nvPr/>
-        </p:nvPicPr>
-        <p:blipFill>
-          <a:blip r:embed="rId3">
-            <a:alphaModFix/>
-          </a:blip>
-          <a:stretch>
-            <a:fillRect/>
-          </a:stretch>
-        </p:blipFill>
-        <p:spPr>
-          <a:xfrm>
-            <a:off x="917725" y="2020100"/>
-            <a:ext cx="7843899" cy="2797325"/>
-          </a:xfrm>
-          <a:prstGeom prst="rect">
-            <a:avLst/>
-          </a:prstGeom>
-          <a:noFill/>
-          <a:ln>
-            <a:noFill/>
-          </a:ln>
-        </p:spPr>
-      </p:pic>
     </p:spTree>
   </p:cSld>
   <p:clrMapOvr>
@@ -12142,7 +10524,7 @@
         </p:nvSpPr>
         <p:spPr>
           <a:xfrm>
-            <a:off x="1822150" y="575950"/>
+            <a:off x="1215660" y="484272"/>
             <a:ext cx="6321600" cy="635400"/>
           </a:xfrm>
           <a:prstGeom prst="rect">
@@ -12165,7 +10547,7 @@
               <a:buNone/>
             </a:pPr>
             <a:r>
-              <a:rPr lang="fr">
+              <a:rPr lang="fr" dirty="0">
                 <a:solidFill>
                   <a:schemeClr val="dk1"/>
                 </a:solidFill>
@@ -12173,14 +10555,14 @@
               <a:t>Schéma technique</a:t>
             </a:r>
             <a:r>
-              <a:rPr lang="fr">
+              <a:rPr lang="fr" dirty="0">
                 <a:solidFill>
                   <a:schemeClr val="accent5"/>
                 </a:solidFill>
               </a:rPr>
               <a:t> </a:t>
             </a:r>
-            <a:endParaRPr>
+            <a:endParaRPr dirty="0">
               <a:solidFill>
                 <a:schemeClr val="accent5"/>
               </a:solidFill>
@@ -12188,388 +10570,45 @@
           </a:p>
         </p:txBody>
       </p:sp>
-      <p:sp>
-        <p:nvSpPr>
-          <p:cNvPr id="110" name="Google Shape;110;p18"/>
-          <p:cNvSpPr txBox="1">
-            <a:spLocks noGrp="1"/>
-          </p:cNvSpPr>
-          <p:nvPr>
-            <p:ph type="body" idx="1"/>
-          </p:nvPr>
-        </p:nvSpPr>
-        <p:spPr>
-          <a:xfrm>
-            <a:off x="276675" y="1506875"/>
-            <a:ext cx="8790000" cy="3002400"/>
-          </a:xfrm>
-          <a:prstGeom prst="rect">
-            <a:avLst/>
-          </a:prstGeom>
-        </p:spPr>
-        <p:txBody>
-          <a:bodyPr spcFirstLastPara="1" wrap="square" lIns="91425" tIns="91425" rIns="91425" bIns="91425" anchor="t" anchorCtr="0">
-            <a:noAutofit/>
-          </a:bodyPr>
-          <a:lstStyle/>
-          <a:p>
-            <a:pPr marL="0" lvl="0" indent="0" algn="l" rtl="0">
-              <a:lnSpc>
-                <a:spcPct val="100000"/>
-              </a:lnSpc>
-              <a:spcBef>
-                <a:spcPts val="0"/>
-              </a:spcBef>
-              <a:spcAft>
-                <a:spcPts val="0"/>
-              </a:spcAft>
-              <a:buNone/>
-            </a:pPr>
-            <a:r>
-              <a:rPr lang="fr">
-                <a:solidFill>
-                  <a:schemeClr val="dk1"/>
-                </a:solidFill>
-              </a:rPr>
-              <a:t>Slide.Js</a:t>
-            </a:r>
-            <a:endParaRPr>
-              <a:solidFill>
-                <a:schemeClr val="dk1"/>
-              </a:solidFill>
-            </a:endParaRPr>
-          </a:p>
-          <a:p>
-            <a:pPr marL="0" lvl="0" indent="0" algn="l" rtl="0">
-              <a:spcBef>
-                <a:spcPts val="0"/>
-              </a:spcBef>
-              <a:spcAft>
-                <a:spcPts val="1600"/>
-              </a:spcAft>
-              <a:buNone/>
-            </a:pPr>
-            <a:endParaRPr/>
-          </a:p>
-        </p:txBody>
-      </p:sp>
       <p:pic>
         <p:nvPicPr>
-          <p:cNvPr id="111" name="Google Shape;111;p18"/>
-          <p:cNvPicPr preferRelativeResize="0"/>
+          <p:cNvPr id="1026" name="Picture 2" descr="C:\wamp64\www\massinissa_project\MVC.jpg"/>
+          <p:cNvPicPr>
+            <a:picLocks noChangeAspect="1" noChangeArrowheads="1"/>
+          </p:cNvPicPr>
           <p:nvPr/>
         </p:nvPicPr>
         <p:blipFill>
           <a:blip r:embed="rId3">
-            <a:alphaModFix/>
+            <a:extLst>
+              <a:ext uri="{28A0092B-C50C-407E-A947-70E740481C1C}">
+                <a14:useLocalDpi xmlns:a14="http://schemas.microsoft.com/office/drawing/2010/main" val="0"/>
+              </a:ext>
+            </a:extLst>
           </a:blip>
+          <a:srcRect/>
           <a:stretch>
             <a:fillRect/>
           </a:stretch>
         </p:blipFill>
-        <p:spPr>
+        <p:spPr bwMode="auto">
           <a:xfrm>
-            <a:off x="276675" y="1506863"/>
-            <a:ext cx="2860799" cy="2849175"/>
+            <a:off x="1959429" y="1091682"/>
+            <a:ext cx="4889240" cy="3760236"/>
           </a:xfrm>
           <a:prstGeom prst="rect">
             <a:avLst/>
           </a:prstGeom>
           <a:noFill/>
-          <a:ln>
-            <a:noFill/>
-          </a:ln>
-        </p:spPr>
-      </p:pic>
-      <p:sp>
-        <p:nvSpPr>
-          <p:cNvPr id="112" name="Google Shape;112;p18"/>
-          <p:cNvSpPr/>
-          <p:nvPr/>
-        </p:nvSpPr>
-        <p:spPr>
-          <a:xfrm>
-            <a:off x="3261050" y="2723838"/>
-            <a:ext cx="711600" cy="415200"/>
-          </a:xfrm>
-          <a:prstGeom prst="rightArrow">
-            <a:avLst>
-              <a:gd name="adj1" fmla="val 50000"/>
-              <a:gd name="adj2" fmla="val 50000"/>
-            </a:avLst>
-          </a:prstGeom>
-          <a:solidFill>
-            <a:schemeClr val="lt2"/>
-          </a:solidFill>
-          <a:ln w="9525" cap="flat" cmpd="sng">
-            <a:solidFill>
-              <a:schemeClr val="dk2"/>
-            </a:solidFill>
-            <a:prstDash val="solid"/>
-            <a:round/>
-            <a:headEnd type="none" w="sm" len="sm"/>
-            <a:tailEnd type="none" w="sm" len="sm"/>
-          </a:ln>
-        </p:spPr>
-        <p:txBody>
-          <a:bodyPr spcFirstLastPara="1" wrap="square" lIns="91425" tIns="91425" rIns="91425" bIns="91425" anchor="ctr" anchorCtr="0">
-            <a:noAutofit/>
-          </a:bodyPr>
-          <a:lstStyle/>
-          <a:p>
-            <a:pPr marL="0" lvl="0" indent="0" algn="l" rtl="0">
-              <a:spcBef>
-                <a:spcPts val="0"/>
-              </a:spcBef>
-              <a:spcAft>
-                <a:spcPts val="0"/>
-              </a:spcAft>
-              <a:buNone/>
-            </a:pPr>
-            <a:endParaRPr/>
-          </a:p>
-        </p:txBody>
-      </p:sp>
-      <p:sp>
-        <p:nvSpPr>
-          <p:cNvPr id="113" name="Google Shape;113;p18"/>
-          <p:cNvSpPr/>
-          <p:nvPr/>
-        </p:nvSpPr>
-        <p:spPr>
-          <a:xfrm>
-            <a:off x="5958775" y="2178775"/>
-            <a:ext cx="904200" cy="415200"/>
-          </a:xfrm>
-          <a:prstGeom prst="rightArrow">
-            <a:avLst>
-              <a:gd name="adj1" fmla="val 50000"/>
-              <a:gd name="adj2" fmla="val 50000"/>
-            </a:avLst>
-          </a:prstGeom>
-          <a:solidFill>
-            <a:schemeClr val="lt2"/>
-          </a:solidFill>
-          <a:ln w="9525" cap="flat" cmpd="sng">
-            <a:solidFill>
-              <a:schemeClr val="dk2"/>
-            </a:solidFill>
-            <a:prstDash val="solid"/>
-            <a:round/>
-            <a:headEnd type="none" w="sm" len="sm"/>
-            <a:tailEnd type="none" w="sm" len="sm"/>
-          </a:ln>
-        </p:spPr>
-        <p:txBody>
-          <a:bodyPr spcFirstLastPara="1" wrap="square" lIns="91425" tIns="91425" rIns="91425" bIns="91425" anchor="ctr" anchorCtr="0">
-            <a:noAutofit/>
-          </a:bodyPr>
-          <a:lstStyle/>
-          <a:p>
-            <a:pPr marL="0" lvl="0" indent="0" algn="l" rtl="0">
-              <a:spcBef>
-                <a:spcPts val="0"/>
-              </a:spcBef>
-              <a:spcAft>
-                <a:spcPts val="0"/>
-              </a:spcAft>
-              <a:buNone/>
-            </a:pPr>
-            <a:endParaRPr/>
-          </a:p>
-        </p:txBody>
-      </p:sp>
-      <p:sp>
-        <p:nvSpPr>
-          <p:cNvPr id="114" name="Google Shape;114;p18"/>
-          <p:cNvSpPr/>
-          <p:nvPr/>
-        </p:nvSpPr>
-        <p:spPr>
-          <a:xfrm>
-            <a:off x="5988475" y="3139025"/>
-            <a:ext cx="844800" cy="415200"/>
-          </a:xfrm>
-          <a:prstGeom prst="rightArrow">
-            <a:avLst>
-              <a:gd name="adj1" fmla="val 50000"/>
-              <a:gd name="adj2" fmla="val 50000"/>
-            </a:avLst>
-          </a:prstGeom>
-          <a:solidFill>
-            <a:schemeClr val="lt2"/>
-          </a:solidFill>
-          <a:ln w="9525" cap="flat" cmpd="sng">
-            <a:solidFill>
-              <a:schemeClr val="dk2"/>
-            </a:solidFill>
-            <a:prstDash val="solid"/>
-            <a:round/>
-            <a:headEnd type="none" w="sm" len="sm"/>
-            <a:tailEnd type="none" w="sm" len="sm"/>
-          </a:ln>
-        </p:spPr>
-        <p:txBody>
-          <a:bodyPr spcFirstLastPara="1" wrap="square" lIns="91425" tIns="91425" rIns="91425" bIns="91425" anchor="ctr" anchorCtr="0">
-            <a:noAutofit/>
-          </a:bodyPr>
-          <a:lstStyle/>
-          <a:p>
-            <a:pPr marL="0" lvl="0" indent="0" algn="l" rtl="0">
-              <a:spcBef>
-                <a:spcPts val="0"/>
-              </a:spcBef>
-              <a:spcAft>
-                <a:spcPts val="0"/>
-              </a:spcAft>
-              <a:buNone/>
-            </a:pPr>
-            <a:endParaRPr/>
-          </a:p>
-        </p:txBody>
-      </p:sp>
-      <p:sp>
-        <p:nvSpPr>
-          <p:cNvPr id="115" name="Google Shape;115;p18"/>
-          <p:cNvSpPr txBox="1"/>
-          <p:nvPr/>
-        </p:nvSpPr>
-        <p:spPr>
-          <a:xfrm>
-            <a:off x="7085275" y="2178775"/>
-            <a:ext cx="1457400" cy="415200"/>
-          </a:xfrm>
-          <a:prstGeom prst="rect">
-            <a:avLst/>
-          </a:prstGeom>
-          <a:noFill/>
-          <a:ln>
-            <a:noFill/>
-          </a:ln>
-        </p:spPr>
-        <p:txBody>
-          <a:bodyPr spcFirstLastPara="1" wrap="square" lIns="91425" tIns="91425" rIns="91425" bIns="91425" anchor="t" anchorCtr="0">
-            <a:noAutofit/>
-          </a:bodyPr>
-          <a:lstStyle/>
-          <a:p>
-            <a:pPr marL="0" lvl="0" indent="0" algn="l" rtl="0">
-              <a:spcBef>
-                <a:spcPts val="0"/>
-              </a:spcBef>
-              <a:spcAft>
-                <a:spcPts val="0"/>
-              </a:spcAft>
-              <a:buNone/>
-            </a:pPr>
-            <a:r>
-              <a:rPr lang="fr" sz="1800">
-                <a:solidFill>
-                  <a:schemeClr val="dk1"/>
-                </a:solidFill>
-                <a:latin typeface="Lato"/>
-                <a:ea typeface="Lato"/>
-                <a:cs typeface="Lato"/>
-                <a:sym typeface="Lato"/>
-              </a:rPr>
-              <a:t>Slide.Js</a:t>
-            </a:r>
-            <a:endParaRPr sz="1800">
-              <a:solidFill>
-                <a:schemeClr val="dk1"/>
-              </a:solidFill>
-              <a:latin typeface="Lato"/>
-              <a:ea typeface="Lato"/>
-              <a:cs typeface="Lato"/>
-              <a:sym typeface="Lato"/>
-            </a:endParaRPr>
-          </a:p>
-        </p:txBody>
-      </p:sp>
-      <p:sp>
-        <p:nvSpPr>
-          <p:cNvPr id="116" name="Google Shape;116;p18"/>
-          <p:cNvSpPr txBox="1"/>
-          <p:nvPr/>
-        </p:nvSpPr>
-        <p:spPr>
-          <a:xfrm>
-            <a:off x="7085275" y="3139025"/>
-            <a:ext cx="1457400" cy="415200"/>
-          </a:xfrm>
-          <a:prstGeom prst="rect">
-            <a:avLst/>
-          </a:prstGeom>
-          <a:noFill/>
-          <a:ln>
-            <a:noFill/>
-          </a:ln>
-        </p:spPr>
-        <p:txBody>
-          <a:bodyPr spcFirstLastPara="1" wrap="square" lIns="91425" tIns="91425" rIns="91425" bIns="91425" anchor="t" anchorCtr="0">
-            <a:noAutofit/>
-          </a:bodyPr>
-          <a:lstStyle/>
-          <a:p>
-            <a:pPr marL="0" lvl="0" indent="0" algn="l" rtl="0">
-              <a:spcBef>
-                <a:spcPts val="0"/>
-              </a:spcBef>
-              <a:spcAft>
-                <a:spcPts val="0"/>
-              </a:spcAft>
-              <a:buNone/>
-            </a:pPr>
-            <a:r>
-              <a:rPr lang="fr" sz="1800">
-                <a:solidFill>
-                  <a:schemeClr val="dk1"/>
-                </a:solidFill>
-                <a:latin typeface="Lato"/>
-                <a:ea typeface="Lato"/>
-                <a:cs typeface="Lato"/>
-                <a:sym typeface="Lato"/>
-              </a:rPr>
-              <a:t>Slider.Js</a:t>
-            </a:r>
-            <a:endParaRPr sz="1800">
-              <a:solidFill>
-                <a:schemeClr val="dk1"/>
-              </a:solidFill>
-              <a:latin typeface="Lato"/>
-              <a:ea typeface="Lato"/>
-              <a:cs typeface="Lato"/>
-              <a:sym typeface="Lato"/>
-            </a:endParaRPr>
-          </a:p>
-        </p:txBody>
-      </p:sp>
-      <p:pic>
-        <p:nvPicPr>
-          <p:cNvPr id="117" name="Google Shape;117;p18"/>
-          <p:cNvPicPr preferRelativeResize="0"/>
-          <p:nvPr/>
-        </p:nvPicPr>
-        <p:blipFill>
-          <a:blip r:embed="rId4">
-            <a:alphaModFix/>
-          </a:blip>
-          <a:stretch>
-            <a:fillRect/>
-          </a:stretch>
-        </p:blipFill>
-        <p:spPr>
-          <a:xfrm>
-            <a:off x="3982825" y="2411963"/>
-            <a:ext cx="2000250" cy="923925"/>
-          </a:xfrm>
-          <a:prstGeom prst="rect">
-            <a:avLst/>
-          </a:prstGeom>
-          <a:noFill/>
-          <a:ln>
-            <a:noFill/>
-          </a:ln>
+          <a:extLst>
+            <a:ext uri="{909E8E84-426E-40DD-AFC4-6F175D3DCCD1}">
+              <a14:hiddenFill xmlns:a14="http://schemas.microsoft.com/office/drawing/2010/main">
+                <a:solidFill>
+                  <a:srgbClr val="FFFFFF"/>
+                </a:solidFill>
+              </a14:hiddenFill>
+            </a:ext>
+          </a:extLst>
         </p:spPr>
       </p:pic>
     </p:spTree>
@@ -12597,94 +10636,6 @@
           <a:chExt cx="0" cy="0"/>
         </a:xfrm>
       </p:grpSpPr>
-      <p:sp>
-        <p:nvSpPr>
-          <p:cNvPr id="122" name="Google Shape;122;p19"/>
-          <p:cNvSpPr txBox="1">
-            <a:spLocks noGrp="1"/>
-          </p:cNvSpPr>
-          <p:nvPr>
-            <p:ph type="title"/>
-          </p:nvPr>
-        </p:nvSpPr>
-        <p:spPr>
-          <a:xfrm>
-            <a:off x="579500" y="483500"/>
-            <a:ext cx="8286000" cy="830100"/>
-          </a:xfrm>
-          <a:prstGeom prst="rect">
-            <a:avLst/>
-          </a:prstGeom>
-          <a:solidFill>
-            <a:srgbClr val="FCE5CD"/>
-          </a:solidFill>
-        </p:spPr>
-        <p:txBody>
-          <a:bodyPr spcFirstLastPara="1" wrap="square" lIns="91425" tIns="91425" rIns="91425" bIns="91425" anchor="t" anchorCtr="0">
-            <a:noAutofit/>
-          </a:bodyPr>
-          <a:lstStyle/>
-          <a:p>
-            <a:pPr marL="457200" lvl="0" indent="0" algn="ctr" rtl="0">
-              <a:lnSpc>
-                <a:spcPct val="150000"/>
-              </a:lnSpc>
-              <a:spcBef>
-                <a:spcPts val="0"/>
-              </a:spcBef>
-              <a:spcAft>
-                <a:spcPts val="1600"/>
-              </a:spcAft>
-              <a:buNone/>
-            </a:pPr>
-            <a:r>
-              <a:rPr lang="fr" sz="3600" b="0">
-                <a:solidFill>
-                  <a:schemeClr val="dk1"/>
-                </a:solidFill>
-                <a:latin typeface="Lato"/>
-                <a:ea typeface="Lato"/>
-                <a:cs typeface="Lato"/>
-                <a:sym typeface="Lato"/>
-              </a:rPr>
-              <a:t>Classe Slide</a:t>
-            </a:r>
-            <a:endParaRPr sz="3600">
-              <a:solidFill>
-                <a:schemeClr val="dk1"/>
-              </a:solidFill>
-            </a:endParaRPr>
-          </a:p>
-        </p:txBody>
-      </p:sp>
-      <p:pic>
-        <p:nvPicPr>
-          <p:cNvPr id="123" name="Google Shape;123;p19"/>
-          <p:cNvPicPr preferRelativeResize="0"/>
-          <p:nvPr/>
-        </p:nvPicPr>
-        <p:blipFill>
-          <a:blip r:embed="rId3">
-            <a:alphaModFix/>
-          </a:blip>
-          <a:stretch>
-            <a:fillRect/>
-          </a:stretch>
-        </p:blipFill>
-        <p:spPr>
-          <a:xfrm>
-            <a:off x="2798025" y="1425725"/>
-            <a:ext cx="4076700" cy="2876550"/>
-          </a:xfrm>
-          <a:prstGeom prst="rect">
-            <a:avLst/>
-          </a:prstGeom>
-          <a:noFill/>
-          <a:ln>
-            <a:noFill/>
-          </a:ln>
-        </p:spPr>
-      </p:pic>
     </p:spTree>
   </p:cSld>
   <p:clrMapOvr>
@@ -12712,7 +10663,7 @@
       </p:grpSpPr>
       <p:sp>
         <p:nvSpPr>
-          <p:cNvPr id="128" name="Google Shape;128;p20"/>
+          <p:cNvPr id="7" name="Google Shape;103;p17"/>
           <p:cNvSpPr txBox="1">
             <a:spLocks noGrp="1"/>
           </p:cNvSpPr>
@@ -12722,8 +10673,8 @@
         </p:nvSpPr>
         <p:spPr>
           <a:xfrm>
-            <a:off x="631550" y="470450"/>
-            <a:ext cx="8286000" cy="830100"/>
+            <a:off x="444748" y="1931437"/>
+            <a:ext cx="8286000" cy="1108629"/>
           </a:xfrm>
           <a:prstGeom prst="rect">
             <a:avLst/>
@@ -12751,18 +10702,14 @@
               <a:buNone/>
             </a:pPr>
             <a:r>
-              <a:rPr lang="fr" sz="3600" b="0">
+              <a:rPr lang="fr-FR" sz="3600" dirty="0" smtClean="0">
                 <a:solidFill>
                   <a:schemeClr val="dk1"/>
                 </a:solidFill>
-                <a:latin typeface="Lato"/>
-                <a:ea typeface="Lato"/>
-                <a:cs typeface="Lato"/>
-                <a:sym typeface="Lato"/>
               </a:rPr>
-              <a:t>Classe Slider</a:t>
+              <a:t>Le CRUD</a:t>
             </a:r>
-            <a:endParaRPr sz="3600">
+            <a:endParaRPr sz="3600" dirty="0">
               <a:solidFill>
                 <a:schemeClr val="dk1"/>
               </a:solidFill>
@@ -12770,90 +10717,6 @@
           </a:p>
         </p:txBody>
       </p:sp>
-      <p:pic>
-        <p:nvPicPr>
-          <p:cNvPr id="129" name="Google Shape;129;p20"/>
-          <p:cNvPicPr preferRelativeResize="0"/>
-          <p:nvPr/>
-        </p:nvPicPr>
-        <p:blipFill>
-          <a:blip r:embed="rId3">
-            <a:alphaModFix/>
-          </a:blip>
-          <a:stretch>
-            <a:fillRect/>
-          </a:stretch>
-        </p:blipFill>
-        <p:spPr>
-          <a:xfrm>
-            <a:off x="152400" y="1391313"/>
-            <a:ext cx="2949826" cy="3220525"/>
-          </a:xfrm>
-          <a:prstGeom prst="rect">
-            <a:avLst/>
-          </a:prstGeom>
-          <a:noFill/>
-          <a:ln>
-            <a:noFill/>
-          </a:ln>
-        </p:spPr>
-      </p:pic>
-      <p:pic>
-        <p:nvPicPr>
-          <p:cNvPr id="130" name="Google Shape;130;p20"/>
-          <p:cNvPicPr preferRelativeResize="0"/>
-          <p:nvPr/>
-        </p:nvPicPr>
-        <p:blipFill>
-          <a:blip r:embed="rId4">
-            <a:alphaModFix/>
-          </a:blip>
-          <a:stretch>
-            <a:fillRect/>
-          </a:stretch>
-        </p:blipFill>
-        <p:spPr>
-          <a:xfrm>
-            <a:off x="3291675" y="1391313"/>
-            <a:ext cx="2713925" cy="3220525"/>
-          </a:xfrm>
-          <a:prstGeom prst="rect">
-            <a:avLst/>
-          </a:prstGeom>
-          <a:noFill/>
-          <a:ln>
-            <a:noFill/>
-          </a:ln>
-        </p:spPr>
-      </p:pic>
-      <p:pic>
-        <p:nvPicPr>
-          <p:cNvPr id="131" name="Google Shape;131;p20"/>
-          <p:cNvPicPr preferRelativeResize="0"/>
-          <p:nvPr/>
-        </p:nvPicPr>
-        <p:blipFill>
-          <a:blip r:embed="rId5">
-            <a:alphaModFix/>
-          </a:blip>
-          <a:stretch>
-            <a:fillRect/>
-          </a:stretch>
-        </p:blipFill>
-        <p:spPr>
-          <a:xfrm>
-            <a:off x="6195050" y="1391325"/>
-            <a:ext cx="2883300" cy="3261600"/>
-          </a:xfrm>
-          <a:prstGeom prst="rect">
-            <a:avLst/>
-          </a:prstGeom>
-          <a:noFill/>
-          <a:ln>
-            <a:noFill/>
-          </a:ln>
-        </p:spPr>
-      </p:pic>
     </p:spTree>
   </p:cSld>
   <p:clrMapOvr>
@@ -12891,8 +10754,8 @@
         </p:nvSpPr>
         <p:spPr>
           <a:xfrm>
-            <a:off x="683650" y="548625"/>
-            <a:ext cx="8286000" cy="830100"/>
+            <a:off x="629055" y="531843"/>
+            <a:ext cx="8286000" cy="1035699"/>
           </a:xfrm>
           <a:prstGeom prst="rect">
             <a:avLst/>
@@ -12920,7 +10783,7 @@
               <a:buNone/>
             </a:pPr>
             <a:r>
-              <a:rPr lang="fr" sz="3600" b="0">
+              <a:rPr lang="fr" sz="3600" b="0" dirty="0" smtClean="0">
                 <a:solidFill>
                   <a:schemeClr val="dk1"/>
                 </a:solidFill>
@@ -12929,9 +10792,9 @@
                 <a:cs typeface="Lato"/>
                 <a:sym typeface="Lato"/>
               </a:rPr>
-              <a:t>Carte des vélos</a:t>
+              <a:t>Create</a:t>
             </a:r>
-            <a:endParaRPr sz="3600">
+            <a:endParaRPr sz="3600" dirty="0">
               <a:solidFill>
                 <a:schemeClr val="dk1"/>
               </a:solidFill>
@@ -12941,30 +10804,84 @@
       </p:sp>
       <p:pic>
         <p:nvPicPr>
-          <p:cNvPr id="137" name="Google Shape;137;p21"/>
-          <p:cNvPicPr preferRelativeResize="0"/>
+          <p:cNvPr id="2050" name="Picture 2" descr="C:\wamp64\www\massinissa_project\capture\Capture.PNG"/>
+          <p:cNvPicPr>
+            <a:picLocks noChangeAspect="1" noChangeArrowheads="1"/>
+          </p:cNvPicPr>
           <p:nvPr/>
         </p:nvPicPr>
         <p:blipFill>
           <a:blip r:embed="rId3">
-            <a:alphaModFix/>
+            <a:extLst>
+              <a:ext uri="{28A0092B-C50C-407E-A947-70E740481C1C}">
+                <a14:useLocalDpi xmlns:a14="http://schemas.microsoft.com/office/drawing/2010/main" val="0"/>
+              </a:ext>
+            </a:extLst>
           </a:blip>
+          <a:srcRect/>
           <a:stretch>
             <a:fillRect/>
           </a:stretch>
         </p:blipFill>
-        <p:spPr>
+        <p:spPr bwMode="auto">
           <a:xfrm>
-            <a:off x="152400" y="1744874"/>
-            <a:ext cx="8839201" cy="2892100"/>
+            <a:off x="629055" y="1707503"/>
+            <a:ext cx="8050796" cy="780564"/>
           </a:xfrm>
           <a:prstGeom prst="rect">
             <a:avLst/>
           </a:prstGeom>
           <a:noFill/>
-          <a:ln>
-            <a:noFill/>
-          </a:ln>
+          <a:extLst>
+            <a:ext uri="{909E8E84-426E-40DD-AFC4-6F175D3DCCD1}">
+              <a14:hiddenFill xmlns:a14="http://schemas.microsoft.com/office/drawing/2010/main">
+                <a:solidFill>
+                  <a:srgbClr val="FFFFFF"/>
+                </a:solidFill>
+              </a14:hiddenFill>
+            </a:ext>
+          </a:extLst>
+        </p:spPr>
+      </p:pic>
+      <p:pic>
+        <p:nvPicPr>
+          <p:cNvPr id="2051" name="Picture 3" descr="C:\wamp64\www\massinissa_project\capture\Ceate-comment.PNG"/>
+          <p:cNvPicPr>
+            <a:picLocks noChangeAspect="1" noChangeArrowheads="1"/>
+          </p:cNvPicPr>
+          <p:nvPr/>
+        </p:nvPicPr>
+        <p:blipFill>
+          <a:blip r:embed="rId4">
+            <a:extLst>
+              <a:ext uri="{28A0092B-C50C-407E-A947-70E740481C1C}">
+                <a14:useLocalDpi xmlns:a14="http://schemas.microsoft.com/office/drawing/2010/main" val="0"/>
+              </a:ext>
+            </a:extLst>
+          </a:blip>
+          <a:srcRect/>
+          <a:stretch>
+            <a:fillRect/>
+          </a:stretch>
+        </p:blipFill>
+        <p:spPr bwMode="auto">
+          <a:xfrm>
+            <a:off x="629055" y="2704970"/>
+            <a:ext cx="8050796" cy="719364"/>
+          </a:xfrm>
+          <a:prstGeom prst="rect">
+            <a:avLst/>
+          </a:prstGeom>
+          <a:noFill/>
+          <a:extLst>
+            <a:ext uri="{909E8E84-426E-40DD-AFC4-6F175D3DCCD1}">
+              <a14:hiddenFill xmlns:a14="http://schemas.microsoft.com/office/drawing/2010/main">
+                <a:solidFill>
+                  <a:srgbClr val="FFFFFF"/>
+                </a:solidFill>
+              </a14:hiddenFill>
+            </a:ext>
+          </a:extLst>
         </p:spPr>
       </p:pic>
     </p:spTree>

</xml_diff>